<commit_message>
word changed in pptx
</commit_message>
<xml_diff>
--- a/presentatie/presentatie_maio_v2.pptx
+++ b/presentatie/presentatie_maio_v2.pptx
@@ -119,7 +119,7 @@
   </p:defaultTextStyle>
   <p:extLst>
     <p:ext uri="{EFAFB233-063F-42B5-8137-9DF3F51BA10A}">
-      <p15:sldGuideLst xmlns:p15="http://schemas.microsoft.com/office/powerpoint/2012/main"/>
+      <p15:sldGuideLst xmlns:p15="http://schemas.microsoft.com/office/powerpoint/2012/main" xmlns=""/>
     </p:ext>
   </p:extLst>
 </p:presentation>
@@ -147,7 +147,7 @@
           <p:cNvPr id="2" name="Rechthoekige driehoek 9">
             <a:extLst>
               <a:ext uri="{FF2B5EF4-FFF2-40B4-BE49-F238E27FC236}">
-                <a16:creationId xmlns:a16="http://schemas.microsoft.com/office/drawing/2014/main" id="{7D12C9C8-8C95-4EDE-AB5B-134ACA2B624C}"/>
+                <a16:creationId xmlns:a16="http://schemas.microsoft.com/office/drawing/2014/main" xmlns="" id="{7D12C9C8-8C95-4EDE-AB5B-134ACA2B624C}"/>
               </a:ext>
             </a:extLst>
           </p:cNvPr>
@@ -321,7 +321,7 @@
           <p:cNvPr id="3" name="Titel 8">
             <a:extLst>
               <a:ext uri="{FF2B5EF4-FFF2-40B4-BE49-F238E27FC236}">
-                <a16:creationId xmlns:a16="http://schemas.microsoft.com/office/drawing/2014/main" id="{B3EAC7F8-2AFA-44A5-BFDC-2D3D2C744B60}"/>
+                <a16:creationId xmlns:a16="http://schemas.microsoft.com/office/drawing/2014/main" xmlns="" id="{B3EAC7F8-2AFA-44A5-BFDC-2D3D2C744B60}"/>
               </a:ext>
             </a:extLst>
           </p:cNvPr>
@@ -360,7 +360,7 @@
           <p:cNvPr id="4" name="Ondertitel 16">
             <a:extLst>
               <a:ext uri="{FF2B5EF4-FFF2-40B4-BE49-F238E27FC236}">
-                <a16:creationId xmlns:a16="http://schemas.microsoft.com/office/drawing/2014/main" id="{C1115813-0AA8-458F-93A1-DF570D2573DF}"/>
+                <a16:creationId xmlns:a16="http://schemas.microsoft.com/office/drawing/2014/main" xmlns="" id="{C1115813-0AA8-458F-93A1-DF570D2573DF}"/>
               </a:ext>
             </a:extLst>
           </p:cNvPr>
@@ -404,7 +404,7 @@
           <p:cNvPr id="5" name="Groep 1">
             <a:extLst>
               <a:ext uri="{FF2B5EF4-FFF2-40B4-BE49-F238E27FC236}">
-                <a16:creationId xmlns:a16="http://schemas.microsoft.com/office/drawing/2014/main" id="{A93801EC-1627-4621-B4E7-70C6091EA922}"/>
+                <a16:creationId xmlns:a16="http://schemas.microsoft.com/office/drawing/2014/main" xmlns="" id="{A93801EC-1627-4621-B4E7-70C6091EA922}"/>
               </a:ext>
             </a:extLst>
           </p:cNvPr>
@@ -424,7 +424,7 @@
             <p:cNvPr id="6" name="Vrije vorm 6">
               <a:extLst>
                 <a:ext uri="{FF2B5EF4-FFF2-40B4-BE49-F238E27FC236}">
-                  <a16:creationId xmlns:a16="http://schemas.microsoft.com/office/drawing/2014/main" id="{3B995065-543E-4CB1-BBC0-5E30E1FCA561}"/>
+                  <a16:creationId xmlns:a16="http://schemas.microsoft.com/office/drawing/2014/main" xmlns="" id="{3B995065-543E-4CB1-BBC0-5E30E1FCA561}"/>
                 </a:ext>
               </a:extLst>
             </p:cNvPr>
@@ -565,7 +565,7 @@
             <p:cNvPr id="7" name="Vrije vorm 7">
               <a:extLst>
                 <a:ext uri="{FF2B5EF4-FFF2-40B4-BE49-F238E27FC236}">
-                  <a16:creationId xmlns:a16="http://schemas.microsoft.com/office/drawing/2014/main" id="{5F1A186B-15B2-41B7-95F1-5582E947EF62}"/>
+                  <a16:creationId xmlns:a16="http://schemas.microsoft.com/office/drawing/2014/main" xmlns="" id="{5F1A186B-15B2-41B7-95F1-5582E947EF62}"/>
                 </a:ext>
               </a:extLst>
             </p:cNvPr>
@@ -701,7 +701,7 @@
             <p:cNvPr id="8" name="Vrije vorm 10">
               <a:extLst>
                 <a:ext uri="{FF2B5EF4-FFF2-40B4-BE49-F238E27FC236}">
-                  <a16:creationId xmlns:a16="http://schemas.microsoft.com/office/drawing/2014/main" id="{9855C10D-4AB0-4D68-948F-E63BF806E6EB}"/>
+                  <a16:creationId xmlns:a16="http://schemas.microsoft.com/office/drawing/2014/main" xmlns="" id="{9855C10D-4AB0-4D68-948F-E63BF806E6EB}"/>
                 </a:ext>
               </a:extLst>
             </p:cNvPr>
@@ -849,7 +849,7 @@
             <p:cNvPr id="9" name="Rechte verbindingslijn 11">
               <a:extLst>
                 <a:ext uri="{FF2B5EF4-FFF2-40B4-BE49-F238E27FC236}">
-                  <a16:creationId xmlns:a16="http://schemas.microsoft.com/office/drawing/2014/main" id="{F182E120-F466-4095-AB69-303FCF01DF7B}"/>
+                  <a16:creationId xmlns:a16="http://schemas.microsoft.com/office/drawing/2014/main" xmlns="" id="{F182E120-F466-4095-AB69-303FCF01DF7B}"/>
                 </a:ext>
               </a:extLst>
             </p:cNvPr>
@@ -880,7 +880,7 @@
           <p:cNvPr id="10" name="Tijdelijke aanduiding voor datum 29">
             <a:extLst>
               <a:ext uri="{FF2B5EF4-FFF2-40B4-BE49-F238E27FC236}">
-                <a16:creationId xmlns:a16="http://schemas.microsoft.com/office/drawing/2014/main" id="{27D1B3D3-3350-48C3-BFAC-EC8EDA57470E}"/>
+                <a16:creationId xmlns:a16="http://schemas.microsoft.com/office/drawing/2014/main" xmlns="" id="{27D1B3D3-3350-48C3-BFAC-EC8EDA57470E}"/>
               </a:ext>
             </a:extLst>
           </p:cNvPr>
@@ -919,7 +919,7 @@
           <p:cNvPr id="11" name="Tijdelijke aanduiding voor voettekst 18">
             <a:extLst>
               <a:ext uri="{FF2B5EF4-FFF2-40B4-BE49-F238E27FC236}">
-                <a16:creationId xmlns:a16="http://schemas.microsoft.com/office/drawing/2014/main" id="{2726ED0B-416F-48DC-A230-AB8716A4CED9}"/>
+                <a16:creationId xmlns:a16="http://schemas.microsoft.com/office/drawing/2014/main" xmlns="" id="{2726ED0B-416F-48DC-A230-AB8716A4CED9}"/>
               </a:ext>
             </a:extLst>
           </p:cNvPr>
@@ -953,7 +953,7 @@
           <p:cNvPr id="12" name="Tijdelijke aanduiding voor dianummer 26">
             <a:extLst>
               <a:ext uri="{FF2B5EF4-FFF2-40B4-BE49-F238E27FC236}">
-                <a16:creationId xmlns:a16="http://schemas.microsoft.com/office/drawing/2014/main" id="{0DD93787-EC8A-42DC-A2A9-C5208635A4CC}"/>
+                <a16:creationId xmlns:a16="http://schemas.microsoft.com/office/drawing/2014/main" xmlns="" id="{0DD93787-EC8A-42DC-A2A9-C5208635A4CC}"/>
               </a:ext>
             </a:extLst>
           </p:cNvPr>
@@ -1021,7 +1021,7 @@
           <p:cNvPr id="2" name="Titel 1">
             <a:extLst>
               <a:ext uri="{FF2B5EF4-FFF2-40B4-BE49-F238E27FC236}">
-                <a16:creationId xmlns:a16="http://schemas.microsoft.com/office/drawing/2014/main" id="{8FB4D35B-1894-4FAA-A17A-FA0F989F0B6C}"/>
+                <a16:creationId xmlns:a16="http://schemas.microsoft.com/office/drawing/2014/main" xmlns="" id="{8FB4D35B-1894-4FAA-A17A-FA0F989F0B6C}"/>
               </a:ext>
             </a:extLst>
           </p:cNvPr>
@@ -1055,7 +1055,7 @@
           <p:cNvPr id="3" name="Tijdelijke aanduiding voor verticale tekst 2">
             <a:extLst>
               <a:ext uri="{FF2B5EF4-FFF2-40B4-BE49-F238E27FC236}">
-                <a16:creationId xmlns:a16="http://schemas.microsoft.com/office/drawing/2014/main" id="{53EEE702-F817-4F27-B5AC-0638AA65745F}"/>
+                <a16:creationId xmlns:a16="http://schemas.microsoft.com/office/drawing/2014/main" xmlns="" id="{53EEE702-F817-4F27-B5AC-0638AA65745F}"/>
               </a:ext>
             </a:extLst>
           </p:cNvPr>
@@ -1134,7 +1134,7 @@
           <p:cNvPr id="4" name="Tijdelijke aanduiding voor datum 3">
             <a:extLst>
               <a:ext uri="{FF2B5EF4-FFF2-40B4-BE49-F238E27FC236}">
-                <a16:creationId xmlns:a16="http://schemas.microsoft.com/office/drawing/2014/main" id="{0AA835D3-4B0F-4095-B95A-3C0C21B86A56}"/>
+                <a16:creationId xmlns:a16="http://schemas.microsoft.com/office/drawing/2014/main" xmlns="" id="{0AA835D3-4B0F-4095-B95A-3C0C21B86A56}"/>
               </a:ext>
             </a:extLst>
           </p:cNvPr>
@@ -1169,7 +1169,7 @@
           <p:cNvPr id="5" name="Tijdelijke aanduiding voor voettekst 4">
             <a:extLst>
               <a:ext uri="{FF2B5EF4-FFF2-40B4-BE49-F238E27FC236}">
-                <a16:creationId xmlns:a16="http://schemas.microsoft.com/office/drawing/2014/main" id="{96E61A9F-F47A-412F-83F2-907646C7EBED}"/>
+                <a16:creationId xmlns:a16="http://schemas.microsoft.com/office/drawing/2014/main" xmlns="" id="{96E61A9F-F47A-412F-83F2-907646C7EBED}"/>
               </a:ext>
             </a:extLst>
           </p:cNvPr>
@@ -1199,7 +1199,7 @@
           <p:cNvPr id="6" name="Tijdelijke aanduiding voor dianummer 5">
             <a:extLst>
               <a:ext uri="{FF2B5EF4-FFF2-40B4-BE49-F238E27FC236}">
-                <a16:creationId xmlns:a16="http://schemas.microsoft.com/office/drawing/2014/main" id="{D961419C-B431-4ED8-AD2E-E71A5FD31BAC}"/>
+                <a16:creationId xmlns:a16="http://schemas.microsoft.com/office/drawing/2014/main" xmlns="" id="{D961419C-B431-4ED8-AD2E-E71A5FD31BAC}"/>
               </a:ext>
             </a:extLst>
           </p:cNvPr>
@@ -1262,7 +1262,7 @@
           <p:cNvPr id="2" name="Verticale titel 1">
             <a:extLst>
               <a:ext uri="{FF2B5EF4-FFF2-40B4-BE49-F238E27FC236}">
-                <a16:creationId xmlns:a16="http://schemas.microsoft.com/office/drawing/2014/main" id="{543AADE5-39BD-42BD-A1FF-353DF7C83C27}"/>
+                <a16:creationId xmlns:a16="http://schemas.microsoft.com/office/drawing/2014/main" xmlns="" id="{543AADE5-39BD-42BD-A1FF-353DF7C83C27}"/>
               </a:ext>
             </a:extLst>
           </p:cNvPr>
@@ -1301,7 +1301,7 @@
           <p:cNvPr id="3" name="Tijdelijke aanduiding voor verticale tekst 2">
             <a:extLst>
               <a:ext uri="{FF2B5EF4-FFF2-40B4-BE49-F238E27FC236}">
-                <a16:creationId xmlns:a16="http://schemas.microsoft.com/office/drawing/2014/main" id="{346E0E3A-E978-4370-BA68-1E81E8F31DBD}"/>
+                <a16:creationId xmlns:a16="http://schemas.microsoft.com/office/drawing/2014/main" xmlns="" id="{346E0E3A-E978-4370-BA68-1E81E8F31DBD}"/>
               </a:ext>
             </a:extLst>
           </p:cNvPr>
@@ -1380,7 +1380,7 @@
           <p:cNvPr id="4" name="Tijdelijke aanduiding voor datum 3">
             <a:extLst>
               <a:ext uri="{FF2B5EF4-FFF2-40B4-BE49-F238E27FC236}">
-                <a16:creationId xmlns:a16="http://schemas.microsoft.com/office/drawing/2014/main" id="{4998752A-3842-4DA7-9671-027BB407FF94}"/>
+                <a16:creationId xmlns:a16="http://schemas.microsoft.com/office/drawing/2014/main" xmlns="" id="{4998752A-3842-4DA7-9671-027BB407FF94}"/>
               </a:ext>
             </a:extLst>
           </p:cNvPr>
@@ -1415,7 +1415,7 @@
           <p:cNvPr id="5" name="Tijdelijke aanduiding voor voettekst 4">
             <a:extLst>
               <a:ext uri="{FF2B5EF4-FFF2-40B4-BE49-F238E27FC236}">
-                <a16:creationId xmlns:a16="http://schemas.microsoft.com/office/drawing/2014/main" id="{1D48CEF9-748C-4956-8079-D0A5C6CD8FC6}"/>
+                <a16:creationId xmlns:a16="http://schemas.microsoft.com/office/drawing/2014/main" xmlns="" id="{1D48CEF9-748C-4956-8079-D0A5C6CD8FC6}"/>
               </a:ext>
             </a:extLst>
           </p:cNvPr>
@@ -1445,7 +1445,7 @@
           <p:cNvPr id="6" name="Tijdelijke aanduiding voor dianummer 5">
             <a:extLst>
               <a:ext uri="{FF2B5EF4-FFF2-40B4-BE49-F238E27FC236}">
-                <a16:creationId xmlns:a16="http://schemas.microsoft.com/office/drawing/2014/main" id="{32FECE73-E36E-43A9-8E52-C6E40E689D58}"/>
+                <a16:creationId xmlns:a16="http://schemas.microsoft.com/office/drawing/2014/main" xmlns="" id="{32FECE73-E36E-43A9-8E52-C6E40E689D58}"/>
               </a:ext>
             </a:extLst>
           </p:cNvPr>
@@ -1508,7 +1508,7 @@
           <p:cNvPr id="2" name="Tijdelijke aanduiding voor inhoud 2">
             <a:extLst>
               <a:ext uri="{FF2B5EF4-FFF2-40B4-BE49-F238E27FC236}">
-                <a16:creationId xmlns:a16="http://schemas.microsoft.com/office/drawing/2014/main" id="{EA4912BA-36C5-4B1A-96DF-1AC20D9537F2}"/>
+                <a16:creationId xmlns:a16="http://schemas.microsoft.com/office/drawing/2014/main" xmlns="" id="{EA4912BA-36C5-4B1A-96DF-1AC20D9537F2}"/>
               </a:ext>
             </a:extLst>
           </p:cNvPr>
@@ -1582,7 +1582,7 @@
           <p:cNvPr id="3" name="Tijdelijke aanduiding voor datum 3">
             <a:extLst>
               <a:ext uri="{FF2B5EF4-FFF2-40B4-BE49-F238E27FC236}">
-                <a16:creationId xmlns:a16="http://schemas.microsoft.com/office/drawing/2014/main" id="{57F7C880-8A7A-4C74-A77C-E972C9307989}"/>
+                <a16:creationId xmlns:a16="http://schemas.microsoft.com/office/drawing/2014/main" xmlns="" id="{57F7C880-8A7A-4C74-A77C-E972C9307989}"/>
               </a:ext>
             </a:extLst>
           </p:cNvPr>
@@ -1617,7 +1617,7 @@
           <p:cNvPr id="4" name="Tijdelijke aanduiding voor voettekst 4">
             <a:extLst>
               <a:ext uri="{FF2B5EF4-FFF2-40B4-BE49-F238E27FC236}">
-                <a16:creationId xmlns:a16="http://schemas.microsoft.com/office/drawing/2014/main" id="{88E2E87D-B8F9-4BA5-95A4-BEA1E9D5800A}"/>
+                <a16:creationId xmlns:a16="http://schemas.microsoft.com/office/drawing/2014/main" xmlns="" id="{88E2E87D-B8F9-4BA5-95A4-BEA1E9D5800A}"/>
               </a:ext>
             </a:extLst>
           </p:cNvPr>
@@ -1647,7 +1647,7 @@
           <p:cNvPr id="5" name="Tijdelijke aanduiding voor dianummer 5">
             <a:extLst>
               <a:ext uri="{FF2B5EF4-FFF2-40B4-BE49-F238E27FC236}">
-                <a16:creationId xmlns:a16="http://schemas.microsoft.com/office/drawing/2014/main" id="{5BFC64C9-F731-42A0-B147-C34E80546F47}"/>
+                <a16:creationId xmlns:a16="http://schemas.microsoft.com/office/drawing/2014/main" xmlns="" id="{5BFC64C9-F731-42A0-B147-C34E80546F47}"/>
               </a:ext>
             </a:extLst>
           </p:cNvPr>
@@ -1680,7 +1680,7 @@
           <p:cNvPr id="6" name="Titel 6">
             <a:extLst>
               <a:ext uri="{FF2B5EF4-FFF2-40B4-BE49-F238E27FC236}">
-                <a16:creationId xmlns:a16="http://schemas.microsoft.com/office/drawing/2014/main" id="{3E03B535-5D82-4267-A64A-92D88AD249D7}"/>
+                <a16:creationId xmlns:a16="http://schemas.microsoft.com/office/drawing/2014/main" xmlns="" id="{3E03B535-5D82-4267-A64A-92D88AD249D7}"/>
               </a:ext>
             </a:extLst>
           </p:cNvPr>
@@ -1763,7 +1763,7 @@
           <p:cNvPr id="2" name="Titel 1">
             <a:extLst>
               <a:ext uri="{FF2B5EF4-FFF2-40B4-BE49-F238E27FC236}">
-                <a16:creationId xmlns:a16="http://schemas.microsoft.com/office/drawing/2014/main" id="{61C8C3CC-A908-4AC0-B918-3B245DBBECDF}"/>
+                <a16:creationId xmlns:a16="http://schemas.microsoft.com/office/drawing/2014/main" xmlns="" id="{61C8C3CC-A908-4AC0-B918-3B245DBBECDF}"/>
               </a:ext>
             </a:extLst>
           </p:cNvPr>
@@ -1806,7 +1806,7 @@
           <p:cNvPr id="3" name="Tijdelijke aanduiding voor tekst 2">
             <a:extLst>
               <a:ext uri="{FF2B5EF4-FFF2-40B4-BE49-F238E27FC236}">
-                <a16:creationId xmlns:a16="http://schemas.microsoft.com/office/drawing/2014/main" id="{4A275899-FEE7-4B7C-AA4A-8E35B4247592}"/>
+                <a16:creationId xmlns:a16="http://schemas.microsoft.com/office/drawing/2014/main" xmlns="" id="{4A275899-FEE7-4B7C-AA4A-8E35B4247592}"/>
               </a:ext>
             </a:extLst>
           </p:cNvPr>
@@ -1849,7 +1849,7 @@
           <p:cNvPr id="4" name="Tijdelijke aanduiding voor datum 3">
             <a:extLst>
               <a:ext uri="{FF2B5EF4-FFF2-40B4-BE49-F238E27FC236}">
-                <a16:creationId xmlns:a16="http://schemas.microsoft.com/office/drawing/2014/main" id="{9B9FDEA2-741F-4DC8-9494-8956FB741D1F}"/>
+                <a16:creationId xmlns:a16="http://schemas.microsoft.com/office/drawing/2014/main" xmlns="" id="{9B9FDEA2-741F-4DC8-9494-8956FB741D1F}"/>
               </a:ext>
             </a:extLst>
           </p:cNvPr>
@@ -1888,7 +1888,7 @@
           <p:cNvPr id="5" name="Tijdelijke aanduiding voor voettekst 4">
             <a:extLst>
               <a:ext uri="{FF2B5EF4-FFF2-40B4-BE49-F238E27FC236}">
-                <a16:creationId xmlns:a16="http://schemas.microsoft.com/office/drawing/2014/main" id="{A7D80BB5-0472-4507-B964-56331434077E}"/>
+                <a16:creationId xmlns:a16="http://schemas.microsoft.com/office/drawing/2014/main" xmlns="" id="{A7D80BB5-0472-4507-B964-56331434077E}"/>
               </a:ext>
             </a:extLst>
           </p:cNvPr>
@@ -1922,7 +1922,7 @@
           <p:cNvPr id="6" name="Tijdelijke aanduiding voor dianummer 5">
             <a:extLst>
               <a:ext uri="{FF2B5EF4-FFF2-40B4-BE49-F238E27FC236}">
-                <a16:creationId xmlns:a16="http://schemas.microsoft.com/office/drawing/2014/main" id="{72A2D30B-9313-4FD5-A049-92EC2034B08A}"/>
+                <a16:creationId xmlns:a16="http://schemas.microsoft.com/office/drawing/2014/main" xmlns="" id="{72A2D30B-9313-4FD5-A049-92EC2034B08A}"/>
               </a:ext>
             </a:extLst>
           </p:cNvPr>
@@ -1959,7 +1959,7 @@
           <p:cNvPr id="7" name="Punthaak 6">
             <a:extLst>
               <a:ext uri="{FF2B5EF4-FFF2-40B4-BE49-F238E27FC236}">
-                <a16:creationId xmlns:a16="http://schemas.microsoft.com/office/drawing/2014/main" id="{C6AA61B4-805A-47CB-82ED-B243A1F4E494}"/>
+                <a16:creationId xmlns:a16="http://schemas.microsoft.com/office/drawing/2014/main" xmlns="" id="{C6AA61B4-805A-47CB-82ED-B243A1F4E494}"/>
               </a:ext>
             </a:extLst>
           </p:cNvPr>
@@ -2146,7 +2146,7 @@
           <p:cNvPr id="8" name="Punthaak 7">
             <a:extLst>
               <a:ext uri="{FF2B5EF4-FFF2-40B4-BE49-F238E27FC236}">
-                <a16:creationId xmlns:a16="http://schemas.microsoft.com/office/drawing/2014/main" id="{8A6DEB10-C5C4-444D-A725-5C9AC4801BDC}"/>
+                <a16:creationId xmlns:a16="http://schemas.microsoft.com/office/drawing/2014/main" xmlns="" id="{8A6DEB10-C5C4-444D-A725-5C9AC4801BDC}"/>
               </a:ext>
             </a:extLst>
           </p:cNvPr>
@@ -2381,7 +2381,7 @@
           <p:cNvPr id="2" name="Tijdelijke aanduiding voor inhoud 2">
             <a:extLst>
               <a:ext uri="{FF2B5EF4-FFF2-40B4-BE49-F238E27FC236}">
-                <a16:creationId xmlns:a16="http://schemas.microsoft.com/office/drawing/2014/main" id="{9024A6C7-B7A5-4CE7-A9D6-1575484218C5}"/>
+                <a16:creationId xmlns:a16="http://schemas.microsoft.com/office/drawing/2014/main" xmlns="" id="{9024A6C7-B7A5-4CE7-A9D6-1575484218C5}"/>
               </a:ext>
             </a:extLst>
           </p:cNvPr>
@@ -2480,7 +2480,7 @@
           <p:cNvPr id="3" name="Tijdelijke aanduiding voor inhoud 3">
             <a:extLst>
               <a:ext uri="{FF2B5EF4-FFF2-40B4-BE49-F238E27FC236}">
-                <a16:creationId xmlns:a16="http://schemas.microsoft.com/office/drawing/2014/main" id="{AC436BE2-64C8-4AB7-8A1B-1F155546760A}"/>
+                <a16:creationId xmlns:a16="http://schemas.microsoft.com/office/drawing/2014/main" xmlns="" id="{AC436BE2-64C8-4AB7-8A1B-1F155546760A}"/>
               </a:ext>
             </a:extLst>
           </p:cNvPr>
@@ -2579,7 +2579,7 @@
           <p:cNvPr id="4" name="Tijdelijke aanduiding voor datum 4">
             <a:extLst>
               <a:ext uri="{FF2B5EF4-FFF2-40B4-BE49-F238E27FC236}">
-                <a16:creationId xmlns:a16="http://schemas.microsoft.com/office/drawing/2014/main" id="{26B19A20-E394-4A8B-A583-9C18935A8E3D}"/>
+                <a16:creationId xmlns:a16="http://schemas.microsoft.com/office/drawing/2014/main" xmlns="" id="{26B19A20-E394-4A8B-A583-9C18935A8E3D}"/>
               </a:ext>
             </a:extLst>
           </p:cNvPr>
@@ -2618,7 +2618,7 @@
           <p:cNvPr id="5" name="Tijdelijke aanduiding voor voettekst 5">
             <a:extLst>
               <a:ext uri="{FF2B5EF4-FFF2-40B4-BE49-F238E27FC236}">
-                <a16:creationId xmlns:a16="http://schemas.microsoft.com/office/drawing/2014/main" id="{6B4599F4-A50C-4C68-A8EB-14FD02F6F90F}"/>
+                <a16:creationId xmlns:a16="http://schemas.microsoft.com/office/drawing/2014/main" xmlns="" id="{6B4599F4-A50C-4C68-A8EB-14FD02F6F90F}"/>
               </a:ext>
             </a:extLst>
           </p:cNvPr>
@@ -2652,7 +2652,7 @@
           <p:cNvPr id="6" name="Tijdelijke aanduiding voor dianummer 6">
             <a:extLst>
               <a:ext uri="{FF2B5EF4-FFF2-40B4-BE49-F238E27FC236}">
-                <a16:creationId xmlns:a16="http://schemas.microsoft.com/office/drawing/2014/main" id="{C0D301F0-DD1F-49BA-B37A-A6E2CA3A606A}"/>
+                <a16:creationId xmlns:a16="http://schemas.microsoft.com/office/drawing/2014/main" xmlns="" id="{C0D301F0-DD1F-49BA-B37A-A6E2CA3A606A}"/>
               </a:ext>
             </a:extLst>
           </p:cNvPr>
@@ -2689,7 +2689,7 @@
           <p:cNvPr id="7" name="Titel 7">
             <a:extLst>
               <a:ext uri="{FF2B5EF4-FFF2-40B4-BE49-F238E27FC236}">
-                <a16:creationId xmlns:a16="http://schemas.microsoft.com/office/drawing/2014/main" id="{54843EC2-500C-49EE-B076-5D3396175620}"/>
+                <a16:creationId xmlns:a16="http://schemas.microsoft.com/office/drawing/2014/main" xmlns="" id="{54843EC2-500C-49EE-B076-5D3396175620}"/>
               </a:ext>
             </a:extLst>
           </p:cNvPr>
@@ -2766,7 +2766,7 @@
           <p:cNvPr id="2" name="Titel 1">
             <a:extLst>
               <a:ext uri="{FF2B5EF4-FFF2-40B4-BE49-F238E27FC236}">
-                <a16:creationId xmlns:a16="http://schemas.microsoft.com/office/drawing/2014/main" id="{60D9924E-6A38-42A3-9053-C8B1CD01CD5B}"/>
+                <a16:creationId xmlns:a16="http://schemas.microsoft.com/office/drawing/2014/main" xmlns="" id="{60D9924E-6A38-42A3-9053-C8B1CD01CD5B}"/>
               </a:ext>
             </a:extLst>
           </p:cNvPr>
@@ -2805,7 +2805,7 @@
           <p:cNvPr id="3" name="Tijdelijke aanduiding voor tekst 2">
             <a:extLst>
               <a:ext uri="{FF2B5EF4-FFF2-40B4-BE49-F238E27FC236}">
-                <a16:creationId xmlns:a16="http://schemas.microsoft.com/office/drawing/2014/main" id="{23F33037-2F4F-4481-A865-B87F5D28B084}"/>
+                <a16:creationId xmlns:a16="http://schemas.microsoft.com/office/drawing/2014/main" xmlns="" id="{23F33037-2F4F-4481-A865-B87F5D28B084}"/>
               </a:ext>
             </a:extLst>
           </p:cNvPr>
@@ -2858,7 +2858,7 @@
           <p:cNvPr id="4" name="Tijdelijke aanduiding voor tekst 3">
             <a:extLst>
               <a:ext uri="{FF2B5EF4-FFF2-40B4-BE49-F238E27FC236}">
-                <a16:creationId xmlns:a16="http://schemas.microsoft.com/office/drawing/2014/main" id="{EB47F9F9-C405-46B4-94BD-C4B8AEE2AEA6}"/>
+                <a16:creationId xmlns:a16="http://schemas.microsoft.com/office/drawing/2014/main" xmlns="" id="{EB47F9F9-C405-46B4-94BD-C4B8AEE2AEA6}"/>
               </a:ext>
             </a:extLst>
           </p:cNvPr>
@@ -2911,7 +2911,7 @@
           <p:cNvPr id="5" name="Tijdelijke aanduiding voor inhoud 4">
             <a:extLst>
               <a:ext uri="{FF2B5EF4-FFF2-40B4-BE49-F238E27FC236}">
-                <a16:creationId xmlns:a16="http://schemas.microsoft.com/office/drawing/2014/main" id="{2A28C528-7E42-4BE8-BAA6-4C9F5017E3E9}"/>
+                <a16:creationId xmlns:a16="http://schemas.microsoft.com/office/drawing/2014/main" xmlns="" id="{2A28C528-7E42-4BE8-BAA6-4C9F5017E3E9}"/>
               </a:ext>
             </a:extLst>
           </p:cNvPr>
@@ -2990,7 +2990,7 @@
           <p:cNvPr id="6" name="Tijdelijke aanduiding voor inhoud 5">
             <a:extLst>
               <a:ext uri="{FF2B5EF4-FFF2-40B4-BE49-F238E27FC236}">
-                <a16:creationId xmlns:a16="http://schemas.microsoft.com/office/drawing/2014/main" id="{D9543F00-9CDF-438B-B854-73F1393B59E3}"/>
+                <a16:creationId xmlns:a16="http://schemas.microsoft.com/office/drawing/2014/main" xmlns="" id="{D9543F00-9CDF-438B-B854-73F1393B59E3}"/>
               </a:ext>
             </a:extLst>
           </p:cNvPr>
@@ -3072,7 +3072,7 @@
           <p:cNvPr id="7" name="Tijdelijke aanduiding voor datum 6">
             <a:extLst>
               <a:ext uri="{FF2B5EF4-FFF2-40B4-BE49-F238E27FC236}">
-                <a16:creationId xmlns:a16="http://schemas.microsoft.com/office/drawing/2014/main" id="{3360C936-EDC6-402D-B6C1-91FCA2EA50AF}"/>
+                <a16:creationId xmlns:a16="http://schemas.microsoft.com/office/drawing/2014/main" xmlns="" id="{3360C936-EDC6-402D-B6C1-91FCA2EA50AF}"/>
               </a:ext>
             </a:extLst>
           </p:cNvPr>
@@ -3107,7 +3107,7 @@
           <p:cNvPr id="8" name="Tijdelijke aanduiding voor voettekst 7">
             <a:extLst>
               <a:ext uri="{FF2B5EF4-FFF2-40B4-BE49-F238E27FC236}">
-                <a16:creationId xmlns:a16="http://schemas.microsoft.com/office/drawing/2014/main" id="{EAF3F40B-C514-4737-A0E6-21028AF1F6E3}"/>
+                <a16:creationId xmlns:a16="http://schemas.microsoft.com/office/drawing/2014/main" xmlns="" id="{EAF3F40B-C514-4737-A0E6-21028AF1F6E3}"/>
               </a:ext>
             </a:extLst>
           </p:cNvPr>
@@ -3137,7 +3137,7 @@
           <p:cNvPr id="9" name="Tijdelijke aanduiding voor dianummer 8">
             <a:extLst>
               <a:ext uri="{FF2B5EF4-FFF2-40B4-BE49-F238E27FC236}">
-                <a16:creationId xmlns:a16="http://schemas.microsoft.com/office/drawing/2014/main" id="{8F6A675F-FC51-41AB-92B9-6060BEEFA3C2}"/>
+                <a16:creationId xmlns:a16="http://schemas.microsoft.com/office/drawing/2014/main" xmlns="" id="{8F6A675F-FC51-41AB-92B9-6060BEEFA3C2}"/>
               </a:ext>
             </a:extLst>
           </p:cNvPr>
@@ -3218,7 +3218,7 @@
           <p:cNvPr id="2" name="Tijdelijke aanduiding voor datum 2">
             <a:extLst>
               <a:ext uri="{FF2B5EF4-FFF2-40B4-BE49-F238E27FC236}">
-                <a16:creationId xmlns:a16="http://schemas.microsoft.com/office/drawing/2014/main" id="{E9CBE5E7-F300-4C36-B300-9547A63A022C}"/>
+                <a16:creationId xmlns:a16="http://schemas.microsoft.com/office/drawing/2014/main" xmlns="" id="{E9CBE5E7-F300-4C36-B300-9547A63A022C}"/>
               </a:ext>
             </a:extLst>
           </p:cNvPr>
@@ -3257,7 +3257,7 @@
           <p:cNvPr id="3" name="Tijdelijke aanduiding voor voettekst 3">
             <a:extLst>
               <a:ext uri="{FF2B5EF4-FFF2-40B4-BE49-F238E27FC236}">
-                <a16:creationId xmlns:a16="http://schemas.microsoft.com/office/drawing/2014/main" id="{2190FAC7-17F9-4935-93FC-E125BC239EB1}"/>
+                <a16:creationId xmlns:a16="http://schemas.microsoft.com/office/drawing/2014/main" xmlns="" id="{2190FAC7-17F9-4935-93FC-E125BC239EB1}"/>
               </a:ext>
             </a:extLst>
           </p:cNvPr>
@@ -3291,7 +3291,7 @@
           <p:cNvPr id="4" name="Tijdelijke aanduiding voor dianummer 4">
             <a:extLst>
               <a:ext uri="{FF2B5EF4-FFF2-40B4-BE49-F238E27FC236}">
-                <a16:creationId xmlns:a16="http://schemas.microsoft.com/office/drawing/2014/main" id="{A5C11EC1-7442-431F-81AE-E141A002DF74}"/>
+                <a16:creationId xmlns:a16="http://schemas.microsoft.com/office/drawing/2014/main" xmlns="" id="{A5C11EC1-7442-431F-81AE-E141A002DF74}"/>
               </a:ext>
             </a:extLst>
           </p:cNvPr>
@@ -3328,7 +3328,7 @@
           <p:cNvPr id="5" name="Titel 5">
             <a:extLst>
               <a:ext uri="{FF2B5EF4-FFF2-40B4-BE49-F238E27FC236}">
-                <a16:creationId xmlns:a16="http://schemas.microsoft.com/office/drawing/2014/main" id="{4496FC3F-3ADE-4ACC-8614-521043A30306}"/>
+                <a16:creationId xmlns:a16="http://schemas.microsoft.com/office/drawing/2014/main" xmlns="" id="{4496FC3F-3ADE-4ACC-8614-521043A30306}"/>
               </a:ext>
             </a:extLst>
           </p:cNvPr>
@@ -3396,7 +3396,7 @@
           <p:cNvPr id="2" name="Tijdelijke aanduiding voor datum 1">
             <a:extLst>
               <a:ext uri="{FF2B5EF4-FFF2-40B4-BE49-F238E27FC236}">
-                <a16:creationId xmlns:a16="http://schemas.microsoft.com/office/drawing/2014/main" id="{86BB13A3-2694-40CF-84E9-79AECBF65036}"/>
+                <a16:creationId xmlns:a16="http://schemas.microsoft.com/office/drawing/2014/main" xmlns="" id="{86BB13A3-2694-40CF-84E9-79AECBF65036}"/>
               </a:ext>
             </a:extLst>
           </p:cNvPr>
@@ -3431,7 +3431,7 @@
           <p:cNvPr id="3" name="Tijdelijke aanduiding voor voettekst 2">
             <a:extLst>
               <a:ext uri="{FF2B5EF4-FFF2-40B4-BE49-F238E27FC236}">
-                <a16:creationId xmlns:a16="http://schemas.microsoft.com/office/drawing/2014/main" id="{B98EF328-0DDE-4D12-A7C5-35ADF3B21E4E}"/>
+                <a16:creationId xmlns:a16="http://schemas.microsoft.com/office/drawing/2014/main" xmlns="" id="{B98EF328-0DDE-4D12-A7C5-35ADF3B21E4E}"/>
               </a:ext>
             </a:extLst>
           </p:cNvPr>
@@ -3461,7 +3461,7 @@
           <p:cNvPr id="4" name="Tijdelijke aanduiding voor dianummer 3">
             <a:extLst>
               <a:ext uri="{FF2B5EF4-FFF2-40B4-BE49-F238E27FC236}">
-                <a16:creationId xmlns:a16="http://schemas.microsoft.com/office/drawing/2014/main" id="{14213817-A9A4-4CF6-98C2-115C4A22B066}"/>
+                <a16:creationId xmlns:a16="http://schemas.microsoft.com/office/drawing/2014/main" xmlns="" id="{14213817-A9A4-4CF6-98C2-115C4A22B066}"/>
               </a:ext>
             </a:extLst>
           </p:cNvPr>
@@ -3533,7 +3533,7 @@
           <p:cNvPr id="2" name="Titel 1">
             <a:extLst>
               <a:ext uri="{FF2B5EF4-FFF2-40B4-BE49-F238E27FC236}">
-                <a16:creationId xmlns:a16="http://schemas.microsoft.com/office/drawing/2014/main" id="{18D4D6E2-2AA1-41B2-85C6-DC94D7487D7C}"/>
+                <a16:creationId xmlns:a16="http://schemas.microsoft.com/office/drawing/2014/main" xmlns="" id="{18D4D6E2-2AA1-41B2-85C6-DC94D7487D7C}"/>
               </a:ext>
             </a:extLst>
           </p:cNvPr>
@@ -3576,7 +3576,7 @@
           <p:cNvPr id="3" name="Tijdelijke aanduiding voor tekst 2">
             <a:extLst>
               <a:ext uri="{FF2B5EF4-FFF2-40B4-BE49-F238E27FC236}">
-                <a16:creationId xmlns:a16="http://schemas.microsoft.com/office/drawing/2014/main" id="{6FA7EC4D-166E-4010-B8C8-257CB434F19C}"/>
+                <a16:creationId xmlns:a16="http://schemas.microsoft.com/office/drawing/2014/main" xmlns="" id="{6FA7EC4D-166E-4010-B8C8-257CB434F19C}"/>
               </a:ext>
             </a:extLst>
           </p:cNvPr>
@@ -3615,7 +3615,7 @@
           <p:cNvPr id="4" name="Tijdelijke aanduiding voor inhoud 3">
             <a:extLst>
               <a:ext uri="{FF2B5EF4-FFF2-40B4-BE49-F238E27FC236}">
-                <a16:creationId xmlns:a16="http://schemas.microsoft.com/office/drawing/2014/main" id="{273F5A56-B971-412F-BBE4-0D85D5D7EB86}"/>
+                <a16:creationId xmlns:a16="http://schemas.microsoft.com/office/drawing/2014/main" xmlns="" id="{273F5A56-B971-412F-BBE4-0D85D5D7EB86}"/>
               </a:ext>
             </a:extLst>
           </p:cNvPr>
@@ -3694,7 +3694,7 @@
           <p:cNvPr id="5" name="Tijdelijke aanduiding voor datum 4">
             <a:extLst>
               <a:ext uri="{FF2B5EF4-FFF2-40B4-BE49-F238E27FC236}">
-                <a16:creationId xmlns:a16="http://schemas.microsoft.com/office/drawing/2014/main" id="{FD837064-6E5E-4B78-87E8-F0149D94843F}"/>
+                <a16:creationId xmlns:a16="http://schemas.microsoft.com/office/drawing/2014/main" xmlns="" id="{FD837064-6E5E-4B78-87E8-F0149D94843F}"/>
               </a:ext>
             </a:extLst>
           </p:cNvPr>
@@ -3729,7 +3729,7 @@
           <p:cNvPr id="6" name="Tijdelijke aanduiding voor voettekst 5">
             <a:extLst>
               <a:ext uri="{FF2B5EF4-FFF2-40B4-BE49-F238E27FC236}">
-                <a16:creationId xmlns:a16="http://schemas.microsoft.com/office/drawing/2014/main" id="{5DF8F021-51D0-4C9C-ACA8-38E2B3DE876E}"/>
+                <a16:creationId xmlns:a16="http://schemas.microsoft.com/office/drawing/2014/main" xmlns="" id="{5DF8F021-51D0-4C9C-ACA8-38E2B3DE876E}"/>
               </a:ext>
             </a:extLst>
           </p:cNvPr>
@@ -3759,7 +3759,7 @@
           <p:cNvPr id="7" name="Tijdelijke aanduiding voor dianummer 6">
             <a:extLst>
               <a:ext uri="{FF2B5EF4-FFF2-40B4-BE49-F238E27FC236}">
-                <a16:creationId xmlns:a16="http://schemas.microsoft.com/office/drawing/2014/main" id="{8EA593F5-EA1E-4F29-878B-C2BE35266B5B}"/>
+                <a16:creationId xmlns:a16="http://schemas.microsoft.com/office/drawing/2014/main" xmlns="" id="{8EA593F5-EA1E-4F29-878B-C2BE35266B5B}"/>
               </a:ext>
             </a:extLst>
           </p:cNvPr>
@@ -3840,7 +3840,7 @@
           <p:cNvPr id="2" name="Tijdelijke aanduiding voor tekst 3">
             <a:extLst>
               <a:ext uri="{FF2B5EF4-FFF2-40B4-BE49-F238E27FC236}">
-                <a16:creationId xmlns:a16="http://schemas.microsoft.com/office/drawing/2014/main" id="{1EEBD6AC-C32D-46AA-B440-495695FF4D33}"/>
+                <a16:creationId xmlns:a16="http://schemas.microsoft.com/office/drawing/2014/main" xmlns="" id="{1EEBD6AC-C32D-46AA-B440-495695FF4D33}"/>
               </a:ext>
             </a:extLst>
           </p:cNvPr>
@@ -3883,7 +3883,7 @@
           <p:cNvPr id="3" name="Tijdelijke aanduiding voor afbeelding 2">
             <a:extLst>
               <a:ext uri="{FF2B5EF4-FFF2-40B4-BE49-F238E27FC236}">
-                <a16:creationId xmlns:a16="http://schemas.microsoft.com/office/drawing/2014/main" id="{F31CD7D6-029E-4D9F-A7AF-B14D1F88E9F1}"/>
+                <a16:creationId xmlns:a16="http://schemas.microsoft.com/office/drawing/2014/main" xmlns="" id="{F31CD7D6-029E-4D9F-A7AF-B14D1F88E9F1}"/>
               </a:ext>
             </a:extLst>
           </p:cNvPr>
@@ -3936,7 +3936,7 @@
           <p:cNvPr id="4" name="Tijdelijke aanduiding voor datum 4">
             <a:extLst>
               <a:ext uri="{FF2B5EF4-FFF2-40B4-BE49-F238E27FC236}">
-                <a16:creationId xmlns:a16="http://schemas.microsoft.com/office/drawing/2014/main" id="{E9510514-EC91-4460-8A1E-8932C06A98E2}"/>
+                <a16:creationId xmlns:a16="http://schemas.microsoft.com/office/drawing/2014/main" xmlns="" id="{E9510514-EC91-4460-8A1E-8932C06A98E2}"/>
               </a:ext>
             </a:extLst>
           </p:cNvPr>
@@ -3975,7 +3975,7 @@
           <p:cNvPr id="5" name="Tijdelijke aanduiding voor voettekst 5">
             <a:extLst>
               <a:ext uri="{FF2B5EF4-FFF2-40B4-BE49-F238E27FC236}">
-                <a16:creationId xmlns:a16="http://schemas.microsoft.com/office/drawing/2014/main" id="{7753140F-D08E-472C-84E9-E6A63279B516}"/>
+                <a16:creationId xmlns:a16="http://schemas.microsoft.com/office/drawing/2014/main" xmlns="" id="{7753140F-D08E-472C-84E9-E6A63279B516}"/>
               </a:ext>
             </a:extLst>
           </p:cNvPr>
@@ -4009,7 +4009,7 @@
           <p:cNvPr id="6" name="Tijdelijke aanduiding voor dianummer 6">
             <a:extLst>
               <a:ext uri="{FF2B5EF4-FFF2-40B4-BE49-F238E27FC236}">
-                <a16:creationId xmlns:a16="http://schemas.microsoft.com/office/drawing/2014/main" id="{E766EE04-BF31-49A1-9C06-AC6B5667DBD6}"/>
+                <a16:creationId xmlns:a16="http://schemas.microsoft.com/office/drawing/2014/main" xmlns="" id="{E766EE04-BF31-49A1-9C06-AC6B5667DBD6}"/>
               </a:ext>
             </a:extLst>
           </p:cNvPr>
@@ -4046,7 +4046,7 @@
           <p:cNvPr id="7" name="Titel 1">
             <a:extLst>
               <a:ext uri="{FF2B5EF4-FFF2-40B4-BE49-F238E27FC236}">
-                <a16:creationId xmlns:a16="http://schemas.microsoft.com/office/drawing/2014/main" id="{E77F5187-0C29-4C6B-A46B-35DF3ED830AB}"/>
+                <a16:creationId xmlns:a16="http://schemas.microsoft.com/office/drawing/2014/main" xmlns="" id="{E77F5187-0C29-4C6B-A46B-35DF3ED830AB}"/>
               </a:ext>
             </a:extLst>
           </p:cNvPr>
@@ -4094,7 +4094,7 @@
           <p:cNvPr id="8" name="Vrije vorm 7">
             <a:extLst>
               <a:ext uri="{FF2B5EF4-FFF2-40B4-BE49-F238E27FC236}">
-                <a16:creationId xmlns:a16="http://schemas.microsoft.com/office/drawing/2014/main" id="{3A1317D4-067D-49D3-9047-84539F0799AE}"/>
+                <a16:creationId xmlns:a16="http://schemas.microsoft.com/office/drawing/2014/main" xmlns="" id="{3A1317D4-067D-49D3-9047-84539F0799AE}"/>
               </a:ext>
             </a:extLst>
           </p:cNvPr>
@@ -4236,7 +4236,7 @@
           <p:cNvPr id="9" name="Vrije vorm 8">
             <a:extLst>
               <a:ext uri="{FF2B5EF4-FFF2-40B4-BE49-F238E27FC236}">
-                <a16:creationId xmlns:a16="http://schemas.microsoft.com/office/drawing/2014/main" id="{092E6B10-B334-49CF-AAB2-7832991671BB}"/>
+                <a16:creationId xmlns:a16="http://schemas.microsoft.com/office/drawing/2014/main" xmlns="" id="{092E6B10-B334-49CF-AAB2-7832991671BB}"/>
               </a:ext>
             </a:extLst>
           </p:cNvPr>
@@ -4379,7 +4379,7 @@
           <p:cNvPr id="10" name="Rechthoekige driehoek 9">
             <a:extLst>
               <a:ext uri="{FF2B5EF4-FFF2-40B4-BE49-F238E27FC236}">
-                <a16:creationId xmlns:a16="http://schemas.microsoft.com/office/drawing/2014/main" id="{7CDECBA4-9380-477A-8F64-137E0B510611}"/>
+                <a16:creationId xmlns:a16="http://schemas.microsoft.com/office/drawing/2014/main" xmlns="" id="{7CDECBA4-9380-477A-8F64-137E0B510611}"/>
               </a:ext>
             </a:extLst>
           </p:cNvPr>
@@ -4547,7 +4547,7 @@
           <p:cNvPr id="11" name="Rechte verbindingslijn 10">
             <a:extLst>
               <a:ext uri="{FF2B5EF4-FFF2-40B4-BE49-F238E27FC236}">
-                <a16:creationId xmlns:a16="http://schemas.microsoft.com/office/drawing/2014/main" id="{224348BA-7298-4858-BB90-1247A403382B}"/>
+                <a16:creationId xmlns:a16="http://schemas.microsoft.com/office/drawing/2014/main" xmlns="" id="{224348BA-7298-4858-BB90-1247A403382B}"/>
               </a:ext>
             </a:extLst>
           </p:cNvPr>
@@ -4577,7 +4577,7 @@
           <p:cNvPr id="12" name="Punthaak 11">
             <a:extLst>
               <a:ext uri="{FF2B5EF4-FFF2-40B4-BE49-F238E27FC236}">
-                <a16:creationId xmlns:a16="http://schemas.microsoft.com/office/drawing/2014/main" id="{BD176335-36CC-4564-BC4F-840D0BA7516A}"/>
+                <a16:creationId xmlns:a16="http://schemas.microsoft.com/office/drawing/2014/main" xmlns="" id="{BD176335-36CC-4564-BC4F-840D0BA7516A}"/>
               </a:ext>
             </a:extLst>
           </p:cNvPr>
@@ -4764,7 +4764,7 @@
           <p:cNvPr id="13" name="Punthaak 12">
             <a:extLst>
               <a:ext uri="{FF2B5EF4-FFF2-40B4-BE49-F238E27FC236}">
-                <a16:creationId xmlns:a16="http://schemas.microsoft.com/office/drawing/2014/main" id="{51465D33-CC73-428E-B243-DE56A359CB82}"/>
+                <a16:creationId xmlns:a16="http://schemas.microsoft.com/office/drawing/2014/main" xmlns="" id="{51465D33-CC73-428E-B243-DE56A359CB82}"/>
               </a:ext>
             </a:extLst>
           </p:cNvPr>
@@ -4989,7 +4989,7 @@
           <p:cNvPr id="2" name="Vrije vorm 12">
             <a:extLst>
               <a:ext uri="{FF2B5EF4-FFF2-40B4-BE49-F238E27FC236}">
-                <a16:creationId xmlns:a16="http://schemas.microsoft.com/office/drawing/2014/main" id="{134D3ABF-1DC6-48C8-A5BD-37D9AFC36D0E}"/>
+                <a16:creationId xmlns:a16="http://schemas.microsoft.com/office/drawing/2014/main" xmlns="" id="{134D3ABF-1DC6-48C8-A5BD-37D9AFC36D0E}"/>
               </a:ext>
             </a:extLst>
           </p:cNvPr>
@@ -5131,7 +5131,7 @@
           <p:cNvPr id="3" name="Vrije vorm 11">
             <a:extLst>
               <a:ext uri="{FF2B5EF4-FFF2-40B4-BE49-F238E27FC236}">
-                <a16:creationId xmlns:a16="http://schemas.microsoft.com/office/drawing/2014/main" id="{B76D35B3-26A6-4309-A6F9-4F28F57B9CD1}"/>
+                <a16:creationId xmlns:a16="http://schemas.microsoft.com/office/drawing/2014/main" xmlns="" id="{B76D35B3-26A6-4309-A6F9-4F28F57B9CD1}"/>
               </a:ext>
             </a:extLst>
           </p:cNvPr>
@@ -5274,7 +5274,7 @@
           <p:cNvPr id="4" name="Rechthoekige driehoek 13">
             <a:extLst>
               <a:ext uri="{FF2B5EF4-FFF2-40B4-BE49-F238E27FC236}">
-                <a16:creationId xmlns:a16="http://schemas.microsoft.com/office/drawing/2014/main" id="{CF812651-82BB-4550-A0E1-D937A0E90FF7}"/>
+                <a16:creationId xmlns:a16="http://schemas.microsoft.com/office/drawing/2014/main" xmlns="" id="{CF812651-82BB-4550-A0E1-D937A0E90FF7}"/>
               </a:ext>
             </a:extLst>
           </p:cNvPr>
@@ -5442,7 +5442,7 @@
           <p:cNvPr id="5" name="Rechte verbindingslijn 14">
             <a:extLst>
               <a:ext uri="{FF2B5EF4-FFF2-40B4-BE49-F238E27FC236}">
-                <a16:creationId xmlns:a16="http://schemas.microsoft.com/office/drawing/2014/main" id="{BE55019C-9DD0-4B22-BAEB-FD96C189360E}"/>
+                <a16:creationId xmlns:a16="http://schemas.microsoft.com/office/drawing/2014/main" xmlns="" id="{BE55019C-9DD0-4B22-BAEB-FD96C189360E}"/>
               </a:ext>
             </a:extLst>
           </p:cNvPr>
@@ -5472,7 +5472,7 @@
           <p:cNvPr id="6" name="Tijdelijke aanduiding voor titel 8">
             <a:extLst>
               <a:ext uri="{FF2B5EF4-FFF2-40B4-BE49-F238E27FC236}">
-                <a16:creationId xmlns:a16="http://schemas.microsoft.com/office/drawing/2014/main" id="{6D7762E1-9EC5-4116-B550-8DB50514B3FA}"/>
+                <a16:creationId xmlns:a16="http://schemas.microsoft.com/office/drawing/2014/main" xmlns="" id="{6D7762E1-9EC5-4116-B550-8DB50514B3FA}"/>
               </a:ext>
             </a:extLst>
           </p:cNvPr>
@@ -5516,7 +5516,7 @@
           <p:cNvPr id="7" name="Tijdelijke aanduiding voor tekst 29">
             <a:extLst>
               <a:ext uri="{FF2B5EF4-FFF2-40B4-BE49-F238E27FC236}">
-                <a16:creationId xmlns:a16="http://schemas.microsoft.com/office/drawing/2014/main" id="{9C60C54C-190F-421B-8D6A-B11AB6239A03}"/>
+                <a16:creationId xmlns:a16="http://schemas.microsoft.com/office/drawing/2014/main" xmlns="" id="{9C60C54C-190F-421B-8D6A-B11AB6239A03}"/>
               </a:ext>
             </a:extLst>
           </p:cNvPr>
@@ -5588,7 +5588,7 @@
           <p:cNvPr id="8" name="Tijdelijke aanduiding voor datum 9">
             <a:extLst>
               <a:ext uri="{FF2B5EF4-FFF2-40B4-BE49-F238E27FC236}">
-                <a16:creationId xmlns:a16="http://schemas.microsoft.com/office/drawing/2014/main" id="{17B1C1AB-2A7F-4C48-8935-8012236E6DF1}"/>
+                <a16:creationId xmlns:a16="http://schemas.microsoft.com/office/drawing/2014/main" xmlns="" id="{17B1C1AB-2A7F-4C48-8935-8012236E6DF1}"/>
               </a:ext>
             </a:extLst>
           </p:cNvPr>
@@ -5654,7 +5654,7 @@
           <p:cNvPr id="9" name="Tijdelijke aanduiding voor voettekst 21">
             <a:extLst>
               <a:ext uri="{FF2B5EF4-FFF2-40B4-BE49-F238E27FC236}">
-                <a16:creationId xmlns:a16="http://schemas.microsoft.com/office/drawing/2014/main" id="{93C1798B-C9F8-4A11-8E7D-A4F3279B0002}"/>
+                <a16:creationId xmlns:a16="http://schemas.microsoft.com/office/drawing/2014/main" xmlns="" id="{93C1798B-C9F8-4A11-8E7D-A4F3279B0002}"/>
               </a:ext>
             </a:extLst>
           </p:cNvPr>
@@ -5715,7 +5715,7 @@
           <p:cNvPr id="10" name="Tijdelijke aanduiding voor dianummer 17">
             <a:extLst>
               <a:ext uri="{FF2B5EF4-FFF2-40B4-BE49-F238E27FC236}">
-                <a16:creationId xmlns:a16="http://schemas.microsoft.com/office/drawing/2014/main" id="{088AD30C-5A36-4B78-8B8F-28B08758854E}"/>
+                <a16:creationId xmlns:a16="http://schemas.microsoft.com/office/drawing/2014/main" xmlns="" id="{088AD30C-5A36-4B78-8B8F-28B08758854E}"/>
               </a:ext>
             </a:extLst>
           </p:cNvPr>
@@ -6138,7 +6138,7 @@
           <p:cNvPr id="2" name="Titel 1">
             <a:extLst>
               <a:ext uri="{FF2B5EF4-FFF2-40B4-BE49-F238E27FC236}">
-                <a16:creationId xmlns:a16="http://schemas.microsoft.com/office/drawing/2014/main" id="{97FCE165-44A4-4CA3-9641-17EFA9C50D3C}"/>
+                <a16:creationId xmlns:a16="http://schemas.microsoft.com/office/drawing/2014/main" xmlns="" id="{97FCE165-44A4-4CA3-9641-17EFA9C50D3C}"/>
               </a:ext>
             </a:extLst>
           </p:cNvPr>
@@ -6175,7 +6175,7 @@
           <p:cNvPr id="3" name="Ondertitel 2">
             <a:extLst>
               <a:ext uri="{FF2B5EF4-FFF2-40B4-BE49-F238E27FC236}">
-                <a16:creationId xmlns:a16="http://schemas.microsoft.com/office/drawing/2014/main" id="{69DAB544-C3AD-4778-9853-DB7B739FF4B7}"/>
+                <a16:creationId xmlns:a16="http://schemas.microsoft.com/office/drawing/2014/main" xmlns="" id="{69DAB544-C3AD-4778-9853-DB7B739FF4B7}"/>
               </a:ext>
             </a:extLst>
           </p:cNvPr>
@@ -6237,7 +6237,7 @@
           <p:cNvPr id="2" name="Titel 2">
             <a:extLst>
               <a:ext uri="{FF2B5EF4-FFF2-40B4-BE49-F238E27FC236}">
-                <a16:creationId xmlns:a16="http://schemas.microsoft.com/office/drawing/2014/main" id="{07CE7803-3864-4609-A18F-084F22F548A0}"/>
+                <a16:creationId xmlns:a16="http://schemas.microsoft.com/office/drawing/2014/main" xmlns="" id="{07CE7803-3864-4609-A18F-084F22F548A0}"/>
               </a:ext>
             </a:extLst>
           </p:cNvPr>
@@ -6266,7 +6266,7 @@
           <p:cNvPr id="3" name="Afbeelding 4">
             <a:extLst>
               <a:ext uri="{FF2B5EF4-FFF2-40B4-BE49-F238E27FC236}">
-                <a16:creationId xmlns:a16="http://schemas.microsoft.com/office/drawing/2014/main" id="{FF54D30E-0A0E-4DF2-9A6B-7294812E2701}"/>
+                <a16:creationId xmlns:a16="http://schemas.microsoft.com/office/drawing/2014/main" xmlns="" id="{FF54D30E-0A0E-4DF2-9A6B-7294812E2701}"/>
               </a:ext>
             </a:extLst>
           </p:cNvPr>
@@ -6300,7 +6300,7 @@
           <p:cNvPr id="4" name="Tijdelijke aanduiding voor inhoud 5">
             <a:extLst>
               <a:ext uri="{FF2B5EF4-FFF2-40B4-BE49-F238E27FC236}">
-                <a16:creationId xmlns:a16="http://schemas.microsoft.com/office/drawing/2014/main" id="{EC89FF22-D11A-47BC-9F06-390486E06CB7}"/>
+                <a16:creationId xmlns:a16="http://schemas.microsoft.com/office/drawing/2014/main" xmlns="" id="{EC89FF22-D11A-47BC-9F06-390486E06CB7}"/>
               </a:ext>
             </a:extLst>
           </p:cNvPr>
@@ -6329,7 +6329,7 @@
           <p:cNvPr id="5" name="Ovaal 6">
             <a:extLst>
               <a:ext uri="{FF2B5EF4-FFF2-40B4-BE49-F238E27FC236}">
-                <a16:creationId xmlns:a16="http://schemas.microsoft.com/office/drawing/2014/main" id="{912D2D81-654A-4450-B1BF-7806E5D5993B}"/>
+                <a16:creationId xmlns:a16="http://schemas.microsoft.com/office/drawing/2014/main" xmlns="" id="{912D2D81-654A-4450-B1BF-7806E5D5993B}"/>
               </a:ext>
             </a:extLst>
           </p:cNvPr>
@@ -6502,7 +6502,7 @@
           <p:cNvPr id="6" name="Ovaal 7">
             <a:extLst>
               <a:ext uri="{FF2B5EF4-FFF2-40B4-BE49-F238E27FC236}">
-                <a16:creationId xmlns:a16="http://schemas.microsoft.com/office/drawing/2014/main" id="{E4A70B45-F46D-4DF2-85BC-8720CD83E656}"/>
+                <a16:creationId xmlns:a16="http://schemas.microsoft.com/office/drawing/2014/main" xmlns="" id="{E4A70B45-F46D-4DF2-85BC-8720CD83E656}"/>
               </a:ext>
             </a:extLst>
           </p:cNvPr>
@@ -6700,7 +6700,7 @@
           <p:cNvPr id="2" name="Titel 2">
             <a:extLst>
               <a:ext uri="{FF2B5EF4-FFF2-40B4-BE49-F238E27FC236}">
-                <a16:creationId xmlns:a16="http://schemas.microsoft.com/office/drawing/2014/main" id="{158D2927-5ECC-4464-9F35-20BAF5A202CE}"/>
+                <a16:creationId xmlns:a16="http://schemas.microsoft.com/office/drawing/2014/main" xmlns="" id="{158D2927-5ECC-4464-9F35-20BAF5A202CE}"/>
               </a:ext>
             </a:extLst>
           </p:cNvPr>
@@ -6729,7 +6729,7 @@
           <p:cNvPr id="3" name="Afbeelding 3">
             <a:extLst>
               <a:ext uri="{FF2B5EF4-FFF2-40B4-BE49-F238E27FC236}">
-                <a16:creationId xmlns:a16="http://schemas.microsoft.com/office/drawing/2014/main" id="{CD154F19-C8D8-4BFF-9361-72DF701087EB}"/>
+                <a16:creationId xmlns:a16="http://schemas.microsoft.com/office/drawing/2014/main" xmlns="" id="{CD154F19-C8D8-4BFF-9361-72DF701087EB}"/>
               </a:ext>
             </a:extLst>
           </p:cNvPr>
@@ -6788,7 +6788,7 @@
           <p:cNvPr id="2" name="Tijdelijke aanduiding voor inhoud 1">
             <a:extLst>
               <a:ext uri="{FF2B5EF4-FFF2-40B4-BE49-F238E27FC236}">
-                <a16:creationId xmlns:a16="http://schemas.microsoft.com/office/drawing/2014/main" id="{2F6879DB-1235-442C-B5B7-1BE5FAA7059D}"/>
+                <a16:creationId xmlns:a16="http://schemas.microsoft.com/office/drawing/2014/main" xmlns="" id="{2F6879DB-1235-442C-B5B7-1BE5FAA7059D}"/>
               </a:ext>
             </a:extLst>
           </p:cNvPr>
@@ -6836,7 +6836,7 @@
           <p:cNvPr id="3" name="Titel 2">
             <a:extLst>
               <a:ext uri="{FF2B5EF4-FFF2-40B4-BE49-F238E27FC236}">
-                <a16:creationId xmlns:a16="http://schemas.microsoft.com/office/drawing/2014/main" id="{54E4AF75-7DF7-483F-924A-DC6DD34439B6}"/>
+                <a16:creationId xmlns:a16="http://schemas.microsoft.com/office/drawing/2014/main" xmlns="" id="{54E4AF75-7DF7-483F-924A-DC6DD34439B6}"/>
               </a:ext>
             </a:extLst>
           </p:cNvPr>
@@ -6898,7 +6898,7 @@
           <p:cNvPr id="2" name="Tijdelijke aanduiding voor inhoud 1">
             <a:extLst>
               <a:ext uri="{FF2B5EF4-FFF2-40B4-BE49-F238E27FC236}">
-                <a16:creationId xmlns:a16="http://schemas.microsoft.com/office/drawing/2014/main" id="{E6F26F6B-8D0B-49C0-BA62-883E488CD737}"/>
+                <a16:creationId xmlns:a16="http://schemas.microsoft.com/office/drawing/2014/main" xmlns="" id="{E6F26F6B-8D0B-49C0-BA62-883E488CD737}"/>
               </a:ext>
             </a:extLst>
           </p:cNvPr>
@@ -7086,12 +7086,12 @@
               <a:t> </a:t>
             </a:r>
             <a:r>
-              <a:rPr lang="nl-NL" dirty="0" err="1"/>
+              <a:rPr lang="nl-NL" dirty="0" err="1" smtClean="0"/>
               <a:t>lower</a:t>
             </a:r>
             <a:r>
-              <a:rPr lang="nl-NL" dirty="0"/>
-              <a:t>) </a:t>
+              <a:rPr lang="nl-NL" dirty="0" smtClean="0"/>
+              <a:t> zone) </a:t>
             </a:r>
             <a:r>
               <a:rPr lang="nl-NL" dirty="0" err="1"/>
@@ -7130,7 +7130,7 @@
           <p:cNvPr id="3" name="Titel 2">
             <a:extLst>
               <a:ext uri="{FF2B5EF4-FFF2-40B4-BE49-F238E27FC236}">
-                <a16:creationId xmlns:a16="http://schemas.microsoft.com/office/drawing/2014/main" id="{F642613C-C345-4861-9D23-43827273FE57}"/>
+                <a16:creationId xmlns:a16="http://schemas.microsoft.com/office/drawing/2014/main" xmlns="" id="{F642613C-C345-4861-9D23-43827273FE57}"/>
               </a:ext>
             </a:extLst>
           </p:cNvPr>
@@ -7184,7 +7184,7 @@
           <p:cNvPr id="2" name="Titel 1">
             <a:extLst>
               <a:ext uri="{FF2B5EF4-FFF2-40B4-BE49-F238E27FC236}">
-                <a16:creationId xmlns:a16="http://schemas.microsoft.com/office/drawing/2014/main" id="{7E862D9B-5262-4B77-9EFC-6070F7366BB4}"/>
+                <a16:creationId xmlns:a16="http://schemas.microsoft.com/office/drawing/2014/main" xmlns="" id="{7E862D9B-5262-4B77-9EFC-6070F7366BB4}"/>
               </a:ext>
             </a:extLst>
           </p:cNvPr>
@@ -7243,7 +7243,7 @@
           <p:cNvPr id="2" name="Titel 2">
             <a:extLst>
               <a:ext uri="{FF2B5EF4-FFF2-40B4-BE49-F238E27FC236}">
-                <a16:creationId xmlns:a16="http://schemas.microsoft.com/office/drawing/2014/main" id="{F4C0E25C-7444-43A5-B8CF-378FE62B2833}"/>
+                <a16:creationId xmlns:a16="http://schemas.microsoft.com/office/drawing/2014/main" xmlns="" id="{F4C0E25C-7444-43A5-B8CF-378FE62B2833}"/>
               </a:ext>
             </a:extLst>
           </p:cNvPr>
@@ -7275,7 +7275,7 @@
           <p:cNvPr id="3" name="Afbeelding 3">
             <a:extLst>
               <a:ext uri="{FF2B5EF4-FFF2-40B4-BE49-F238E27FC236}">
-                <a16:creationId xmlns:a16="http://schemas.microsoft.com/office/drawing/2014/main" id="{CFADF599-EF13-4760-8C79-42D8D0FC44E5}"/>
+                <a16:creationId xmlns:a16="http://schemas.microsoft.com/office/drawing/2014/main" xmlns="" id="{CFADF599-EF13-4760-8C79-42D8D0FC44E5}"/>
               </a:ext>
             </a:extLst>
           </p:cNvPr>
@@ -7334,7 +7334,7 @@
           <p:cNvPr id="2" name="Titel 1">
             <a:extLst>
               <a:ext uri="{FF2B5EF4-FFF2-40B4-BE49-F238E27FC236}">
-                <a16:creationId xmlns:a16="http://schemas.microsoft.com/office/drawing/2014/main" id="{92DD8F54-D7B4-45A2-9E3E-A08B8D51D8E6}"/>
+                <a16:creationId xmlns:a16="http://schemas.microsoft.com/office/drawing/2014/main" xmlns="" id="{92DD8F54-D7B4-45A2-9E3E-A08B8D51D8E6}"/>
               </a:ext>
             </a:extLst>
           </p:cNvPr>
@@ -7366,7 +7366,7 @@
           <p:cNvPr id="3" name="Rechthoek 55">
             <a:extLst>
               <a:ext uri="{FF2B5EF4-FFF2-40B4-BE49-F238E27FC236}">
-                <a16:creationId xmlns:a16="http://schemas.microsoft.com/office/drawing/2014/main" id="{7FE3F9EE-2FAD-459D-B03F-B9D2F42C69DC}"/>
+                <a16:creationId xmlns:a16="http://schemas.microsoft.com/office/drawing/2014/main" xmlns="" id="{7FE3F9EE-2FAD-459D-B03F-B9D2F42C69DC}"/>
               </a:ext>
             </a:extLst>
           </p:cNvPr>
@@ -7468,7 +7468,7 @@
           <p:cNvPr id="4" name="Rechthoek 58">
             <a:extLst>
               <a:ext uri="{FF2B5EF4-FFF2-40B4-BE49-F238E27FC236}">
-                <a16:creationId xmlns:a16="http://schemas.microsoft.com/office/drawing/2014/main" id="{2B36BFCB-D379-46E1-B58C-72F70CF87D34}"/>
+                <a16:creationId xmlns:a16="http://schemas.microsoft.com/office/drawing/2014/main" xmlns="" id="{2B36BFCB-D379-46E1-B58C-72F70CF87D34}"/>
               </a:ext>
             </a:extLst>
           </p:cNvPr>
@@ -7538,7 +7538,7 @@
           <p:cNvPr id="5" name="Rechthoek 70">
             <a:extLst>
               <a:ext uri="{FF2B5EF4-FFF2-40B4-BE49-F238E27FC236}">
-                <a16:creationId xmlns:a16="http://schemas.microsoft.com/office/drawing/2014/main" id="{9EB90ACC-F326-4A94-9711-AA15A69D1036}"/>
+                <a16:creationId xmlns:a16="http://schemas.microsoft.com/office/drawing/2014/main" xmlns="" id="{9EB90ACC-F326-4A94-9711-AA15A69D1036}"/>
               </a:ext>
             </a:extLst>
           </p:cNvPr>
@@ -7640,7 +7640,7 @@
           <p:cNvPr id="6" name="Gebogen pijl 71">
             <a:extLst>
               <a:ext uri="{FF2B5EF4-FFF2-40B4-BE49-F238E27FC236}">
-                <a16:creationId xmlns:a16="http://schemas.microsoft.com/office/drawing/2014/main" id="{D4ADF174-6BAD-4EA1-BE0E-1EF6BDE9746F}"/>
+                <a16:creationId xmlns:a16="http://schemas.microsoft.com/office/drawing/2014/main" xmlns="" id="{D4ADF174-6BAD-4EA1-BE0E-1EF6BDE9746F}"/>
               </a:ext>
             </a:extLst>
           </p:cNvPr>
@@ -7838,7 +7838,7 @@
           <p:cNvPr id="7" name="Tekstvak 72">
             <a:extLst>
               <a:ext uri="{FF2B5EF4-FFF2-40B4-BE49-F238E27FC236}">
-                <a16:creationId xmlns:a16="http://schemas.microsoft.com/office/drawing/2014/main" id="{17163E10-CBC2-4DED-9B51-5B123119E7DE}"/>
+                <a16:creationId xmlns:a16="http://schemas.microsoft.com/office/drawing/2014/main" xmlns="" id="{17163E10-CBC2-4DED-9B51-5B123119E7DE}"/>
               </a:ext>
             </a:extLst>
           </p:cNvPr>
@@ -7902,7 +7902,7 @@
           <p:cNvPr id="8" name="Rechthoek 74">
             <a:extLst>
               <a:ext uri="{FF2B5EF4-FFF2-40B4-BE49-F238E27FC236}">
-                <a16:creationId xmlns:a16="http://schemas.microsoft.com/office/drawing/2014/main" id="{51850DCA-C672-4BDE-B53F-16D6CEA88AAA}"/>
+                <a16:creationId xmlns:a16="http://schemas.microsoft.com/office/drawing/2014/main" xmlns="" id="{51850DCA-C672-4BDE-B53F-16D6CEA88AAA}"/>
               </a:ext>
             </a:extLst>
           </p:cNvPr>
@@ -7972,7 +7972,7 @@
           <p:cNvPr id="9" name="Rechthoek 75">
             <a:extLst>
               <a:ext uri="{FF2B5EF4-FFF2-40B4-BE49-F238E27FC236}">
-                <a16:creationId xmlns:a16="http://schemas.microsoft.com/office/drawing/2014/main" id="{005D5BAF-5A07-4096-8F46-C2BED0576491}"/>
+                <a16:creationId xmlns:a16="http://schemas.microsoft.com/office/drawing/2014/main" xmlns="" id="{005D5BAF-5A07-4096-8F46-C2BED0576491}"/>
               </a:ext>
             </a:extLst>
           </p:cNvPr>
@@ -8074,7 +8074,7 @@
           <p:cNvPr id="10" name="PIJL-RECHTS 76">
             <a:extLst>
               <a:ext uri="{FF2B5EF4-FFF2-40B4-BE49-F238E27FC236}">
-                <a16:creationId xmlns:a16="http://schemas.microsoft.com/office/drawing/2014/main" id="{240180AF-2369-4C62-B199-5C250373D945}"/>
+                <a16:creationId xmlns:a16="http://schemas.microsoft.com/office/drawing/2014/main" xmlns="" id="{240180AF-2369-4C62-B199-5C250373D945}"/>
               </a:ext>
             </a:extLst>
           </p:cNvPr>
@@ -8240,7 +8240,7 @@
           <p:cNvPr id="11" name="PIJL-RECHTS 77">
             <a:extLst>
               <a:ext uri="{FF2B5EF4-FFF2-40B4-BE49-F238E27FC236}">
-                <a16:creationId xmlns:a16="http://schemas.microsoft.com/office/drawing/2014/main" id="{F6FA5B5D-1487-4A93-8A59-63A532974C23}"/>
+                <a16:creationId xmlns:a16="http://schemas.microsoft.com/office/drawing/2014/main" xmlns="" id="{F6FA5B5D-1487-4A93-8A59-63A532974C23}"/>
               </a:ext>
             </a:extLst>
           </p:cNvPr>
@@ -8406,7 +8406,7 @@
           <p:cNvPr id="12" name="PIJL-RECHTS 78">
             <a:extLst>
               <a:ext uri="{FF2B5EF4-FFF2-40B4-BE49-F238E27FC236}">
-                <a16:creationId xmlns:a16="http://schemas.microsoft.com/office/drawing/2014/main" id="{4917B742-D570-4058-84C2-50105FD12371}"/>
+                <a16:creationId xmlns:a16="http://schemas.microsoft.com/office/drawing/2014/main" xmlns="" id="{4917B742-D570-4058-84C2-50105FD12371}"/>
               </a:ext>
             </a:extLst>
           </p:cNvPr>
@@ -8572,7 +8572,7 @@
           <p:cNvPr id="13" name="Rechthoek 82">
             <a:extLst>
               <a:ext uri="{FF2B5EF4-FFF2-40B4-BE49-F238E27FC236}">
-                <a16:creationId xmlns:a16="http://schemas.microsoft.com/office/drawing/2014/main" id="{98D8993A-44A5-425E-9D46-F48614CB4C1B}"/>
+                <a16:creationId xmlns:a16="http://schemas.microsoft.com/office/drawing/2014/main" xmlns="" id="{98D8993A-44A5-425E-9D46-F48614CB4C1B}"/>
               </a:ext>
             </a:extLst>
           </p:cNvPr>
@@ -8674,7 +8674,7 @@
           <p:cNvPr id="14" name="PIJL-RECHTS 83">
             <a:extLst>
               <a:ext uri="{FF2B5EF4-FFF2-40B4-BE49-F238E27FC236}">
-                <a16:creationId xmlns:a16="http://schemas.microsoft.com/office/drawing/2014/main" id="{5D9965B8-4287-4662-A15D-DE3C9200A6EF}"/>
+                <a16:creationId xmlns:a16="http://schemas.microsoft.com/office/drawing/2014/main" xmlns="" id="{5D9965B8-4287-4662-A15D-DE3C9200A6EF}"/>
               </a:ext>
             </a:extLst>
           </p:cNvPr>
@@ -8840,7 +8840,7 @@
           <p:cNvPr id="15" name="PIJL-OMHOOG 87">
             <a:extLst>
               <a:ext uri="{FF2B5EF4-FFF2-40B4-BE49-F238E27FC236}">
-                <a16:creationId xmlns:a16="http://schemas.microsoft.com/office/drawing/2014/main" id="{E0CFB952-EAB1-445F-9965-A8866DC3C057}"/>
+                <a16:creationId xmlns:a16="http://schemas.microsoft.com/office/drawing/2014/main" xmlns="" id="{E0CFB952-EAB1-445F-9965-A8866DC3C057}"/>
               </a:ext>
             </a:extLst>
           </p:cNvPr>
@@ -9030,7 +9030,7 @@
           <p:cNvPr id="2" name="Titel 1">
             <a:extLst>
               <a:ext uri="{FF2B5EF4-FFF2-40B4-BE49-F238E27FC236}">
-                <a16:creationId xmlns:a16="http://schemas.microsoft.com/office/drawing/2014/main" id="{0F6FF73C-2A03-4D57-8147-6A36072C0DDA}"/>
+                <a16:creationId xmlns:a16="http://schemas.microsoft.com/office/drawing/2014/main" xmlns="" id="{0F6FF73C-2A03-4D57-8147-6A36072C0DDA}"/>
               </a:ext>
             </a:extLst>
           </p:cNvPr>
@@ -9076,7 +9076,7 @@
           <p:cNvPr id="3" name="Rechthoek 55">
             <a:extLst>
               <a:ext uri="{FF2B5EF4-FFF2-40B4-BE49-F238E27FC236}">
-                <a16:creationId xmlns:a16="http://schemas.microsoft.com/office/drawing/2014/main" id="{C4F532CB-9DF5-4022-B5BE-F33CFCF59761}"/>
+                <a16:creationId xmlns:a16="http://schemas.microsoft.com/office/drawing/2014/main" xmlns="" id="{C4F532CB-9DF5-4022-B5BE-F33CFCF59761}"/>
               </a:ext>
             </a:extLst>
           </p:cNvPr>
@@ -9178,7 +9178,7 @@
           <p:cNvPr id="4" name="Rechthoek 58">
             <a:extLst>
               <a:ext uri="{FF2B5EF4-FFF2-40B4-BE49-F238E27FC236}">
-                <a16:creationId xmlns:a16="http://schemas.microsoft.com/office/drawing/2014/main" id="{CD49CC54-CC42-4D44-B61A-596687BC7B6E}"/>
+                <a16:creationId xmlns:a16="http://schemas.microsoft.com/office/drawing/2014/main" xmlns="" id="{CD49CC54-CC42-4D44-B61A-596687BC7B6E}"/>
               </a:ext>
             </a:extLst>
           </p:cNvPr>
@@ -9248,7 +9248,7 @@
           <p:cNvPr id="5" name="Rechthoek 74">
             <a:extLst>
               <a:ext uri="{FF2B5EF4-FFF2-40B4-BE49-F238E27FC236}">
-                <a16:creationId xmlns:a16="http://schemas.microsoft.com/office/drawing/2014/main" id="{6D923322-8BA7-4B2D-BBC8-561C9FBBE79C}"/>
+                <a16:creationId xmlns:a16="http://schemas.microsoft.com/office/drawing/2014/main" xmlns="" id="{6D923322-8BA7-4B2D-BBC8-561C9FBBE79C}"/>
               </a:ext>
             </a:extLst>
           </p:cNvPr>
@@ -9318,7 +9318,7 @@
           <p:cNvPr id="6" name="Rechthoek 75">
             <a:extLst>
               <a:ext uri="{FF2B5EF4-FFF2-40B4-BE49-F238E27FC236}">
-                <a16:creationId xmlns:a16="http://schemas.microsoft.com/office/drawing/2014/main" id="{7F8B7500-3D8E-41C1-9DDC-7E9DA642F864}"/>
+                <a16:creationId xmlns:a16="http://schemas.microsoft.com/office/drawing/2014/main" xmlns="" id="{7F8B7500-3D8E-41C1-9DDC-7E9DA642F864}"/>
               </a:ext>
             </a:extLst>
           </p:cNvPr>
@@ -9420,7 +9420,7 @@
           <p:cNvPr id="7" name="PIJL-RECHTS 77">
             <a:extLst>
               <a:ext uri="{FF2B5EF4-FFF2-40B4-BE49-F238E27FC236}">
-                <a16:creationId xmlns:a16="http://schemas.microsoft.com/office/drawing/2014/main" id="{A008C31D-0EA9-44D6-9212-23199DAA95E2}"/>
+                <a16:creationId xmlns:a16="http://schemas.microsoft.com/office/drawing/2014/main" xmlns="" id="{A008C31D-0EA9-44D6-9212-23199DAA95E2}"/>
               </a:ext>
             </a:extLst>
           </p:cNvPr>
@@ -9586,7 +9586,7 @@
           <p:cNvPr id="8" name="PIJL-RECHTS 78">
             <a:extLst>
               <a:ext uri="{FF2B5EF4-FFF2-40B4-BE49-F238E27FC236}">
-                <a16:creationId xmlns:a16="http://schemas.microsoft.com/office/drawing/2014/main" id="{EB9F061B-0E0B-4955-951C-905FF252099D}"/>
+                <a16:creationId xmlns:a16="http://schemas.microsoft.com/office/drawing/2014/main" xmlns="" id="{EB9F061B-0E0B-4955-951C-905FF252099D}"/>
               </a:ext>
             </a:extLst>
           </p:cNvPr>
@@ -9752,7 +9752,7 @@
           <p:cNvPr id="9" name="Rechthoek 82">
             <a:extLst>
               <a:ext uri="{FF2B5EF4-FFF2-40B4-BE49-F238E27FC236}">
-                <a16:creationId xmlns:a16="http://schemas.microsoft.com/office/drawing/2014/main" id="{ABC3A96E-A705-4477-8064-48DFF2385DA5}"/>
+                <a16:creationId xmlns:a16="http://schemas.microsoft.com/office/drawing/2014/main" xmlns="" id="{ABC3A96E-A705-4477-8064-48DFF2385DA5}"/>
               </a:ext>
             </a:extLst>
           </p:cNvPr>
@@ -9854,7 +9854,7 @@
           <p:cNvPr id="10" name="PIJL-RECHTS 83">
             <a:extLst>
               <a:ext uri="{FF2B5EF4-FFF2-40B4-BE49-F238E27FC236}">
-                <a16:creationId xmlns:a16="http://schemas.microsoft.com/office/drawing/2014/main" id="{1B8315B1-A13F-42A2-A174-6EE0FE16DAD8}"/>
+                <a16:creationId xmlns:a16="http://schemas.microsoft.com/office/drawing/2014/main" xmlns="" id="{1B8315B1-A13F-42A2-A174-6EE0FE16DAD8}"/>
               </a:ext>
             </a:extLst>
           </p:cNvPr>
@@ -10020,7 +10020,7 @@
           <p:cNvPr id="11" name="PIJL-OMHOOG 87">
             <a:extLst>
               <a:ext uri="{FF2B5EF4-FFF2-40B4-BE49-F238E27FC236}">
-                <a16:creationId xmlns:a16="http://schemas.microsoft.com/office/drawing/2014/main" id="{F8D4FE4A-1D50-4EE6-A7A4-D5CE1CEF8F86}"/>
+                <a16:creationId xmlns:a16="http://schemas.microsoft.com/office/drawing/2014/main" xmlns="" id="{F8D4FE4A-1D50-4EE6-A7A4-D5CE1CEF8F86}"/>
               </a:ext>
             </a:extLst>
           </p:cNvPr>
@@ -10185,7 +10185,7 @@
           <p:cNvPr id="12" name="PIJL-OMLAAG 2">
             <a:extLst>
               <a:ext uri="{FF2B5EF4-FFF2-40B4-BE49-F238E27FC236}">
-                <a16:creationId xmlns:a16="http://schemas.microsoft.com/office/drawing/2014/main" id="{9D5C0E5A-3ECD-4AAE-898D-CA5FEF689C0B}"/>
+                <a16:creationId xmlns:a16="http://schemas.microsoft.com/office/drawing/2014/main" xmlns="" id="{9D5C0E5A-3ECD-4AAE-898D-CA5FEF689C0B}"/>
               </a:ext>
             </a:extLst>
           </p:cNvPr>
@@ -10351,7 +10351,7 @@
           <p:cNvPr id="13" name="Rechthoek 16">
             <a:extLst>
               <a:ext uri="{FF2B5EF4-FFF2-40B4-BE49-F238E27FC236}">
-                <a16:creationId xmlns:a16="http://schemas.microsoft.com/office/drawing/2014/main" id="{681BFF96-7E3F-4068-AB62-166CF8A5B662}"/>
+                <a16:creationId xmlns:a16="http://schemas.microsoft.com/office/drawing/2014/main" xmlns="" id="{681BFF96-7E3F-4068-AB62-166CF8A5B662}"/>
               </a:ext>
             </a:extLst>
           </p:cNvPr>
@@ -10421,7 +10421,7 @@
           <p:cNvPr id="14" name="PIJL-RECHTS 17">
             <a:extLst>
               <a:ext uri="{FF2B5EF4-FFF2-40B4-BE49-F238E27FC236}">
-                <a16:creationId xmlns:a16="http://schemas.microsoft.com/office/drawing/2014/main" id="{22B8851E-48FC-46A9-916C-EA313A366910}"/>
+                <a16:creationId xmlns:a16="http://schemas.microsoft.com/office/drawing/2014/main" xmlns="" id="{22B8851E-48FC-46A9-916C-EA313A366910}"/>
               </a:ext>
             </a:extLst>
           </p:cNvPr>
@@ -10587,7 +10587,7 @@
           <p:cNvPr id="15" name="U-vormige pijl 4">
             <a:extLst>
               <a:ext uri="{FF2B5EF4-FFF2-40B4-BE49-F238E27FC236}">
-                <a16:creationId xmlns:a16="http://schemas.microsoft.com/office/drawing/2014/main" id="{03BC6FC1-24F6-4649-B4DF-4A2676BA9429}"/>
+                <a16:creationId xmlns:a16="http://schemas.microsoft.com/office/drawing/2014/main" xmlns="" id="{03BC6FC1-24F6-4649-B4DF-4A2676BA9429}"/>
               </a:ext>
             </a:extLst>
           </p:cNvPr>
@@ -10834,7 +10834,7 @@
           <p:cNvPr id="2" name="Rechthoek: afgeronde hoeken 27">
             <a:extLst>
               <a:ext uri="{FF2B5EF4-FFF2-40B4-BE49-F238E27FC236}">
-                <a16:creationId xmlns:a16="http://schemas.microsoft.com/office/drawing/2014/main" id="{63D27C08-A8EF-47FE-869E-F826CB1B428D}"/>
+                <a16:creationId xmlns:a16="http://schemas.microsoft.com/office/drawing/2014/main" xmlns="" id="{63D27C08-A8EF-47FE-869E-F826CB1B428D}"/>
               </a:ext>
             </a:extLst>
           </p:cNvPr>
@@ -11053,7 +11053,7 @@
           <p:cNvPr id="3" name="Rechthoek: afgeronde hoeken 13">
             <a:extLst>
               <a:ext uri="{FF2B5EF4-FFF2-40B4-BE49-F238E27FC236}">
-                <a16:creationId xmlns:a16="http://schemas.microsoft.com/office/drawing/2014/main" id="{E2B582E4-61B9-4081-930B-ED4C75C63C21}"/>
+                <a16:creationId xmlns:a16="http://schemas.microsoft.com/office/drawing/2014/main" xmlns="" id="{E2B582E4-61B9-4081-930B-ED4C75C63C21}"/>
               </a:ext>
             </a:extLst>
           </p:cNvPr>
@@ -11272,7 +11272,7 @@
           <p:cNvPr id="4" name="Rechthoek: afgeronde hoeken 5">
             <a:extLst>
               <a:ext uri="{FF2B5EF4-FFF2-40B4-BE49-F238E27FC236}">
-                <a16:creationId xmlns:a16="http://schemas.microsoft.com/office/drawing/2014/main" id="{95E3FDC6-A006-412C-B40E-50C311A86A8D}"/>
+                <a16:creationId xmlns:a16="http://schemas.microsoft.com/office/drawing/2014/main" xmlns="" id="{95E3FDC6-A006-412C-B40E-50C311A86A8D}"/>
               </a:ext>
             </a:extLst>
           </p:cNvPr>
@@ -11494,7 +11494,7 @@
           <p:cNvPr id="5" name="Pijl: rechts 11">
             <a:extLst>
               <a:ext uri="{FF2B5EF4-FFF2-40B4-BE49-F238E27FC236}">
-                <a16:creationId xmlns:a16="http://schemas.microsoft.com/office/drawing/2014/main" id="{87462B77-91CF-4F52-B444-48901A0B87E2}"/>
+                <a16:creationId xmlns:a16="http://schemas.microsoft.com/office/drawing/2014/main" xmlns="" id="{87462B77-91CF-4F52-B444-48901A0B87E2}"/>
               </a:ext>
             </a:extLst>
           </p:cNvPr>
@@ -11663,7 +11663,7 @@
           <p:cNvPr id="6" name="Pijl: rechts 16">
             <a:extLst>
               <a:ext uri="{FF2B5EF4-FFF2-40B4-BE49-F238E27FC236}">
-                <a16:creationId xmlns:a16="http://schemas.microsoft.com/office/drawing/2014/main" id="{96A6E639-F45B-4A0F-B93C-EFEF09CBBBB0}"/>
+                <a16:creationId xmlns:a16="http://schemas.microsoft.com/office/drawing/2014/main" xmlns="" id="{96A6E639-F45B-4A0F-B93C-EFEF09CBBBB0}"/>
               </a:ext>
             </a:extLst>
           </p:cNvPr>
@@ -11832,7 +11832,7 @@
           <p:cNvPr id="7" name="Rechthoek: afgeronde hoeken 18">
             <a:extLst>
               <a:ext uri="{FF2B5EF4-FFF2-40B4-BE49-F238E27FC236}">
-                <a16:creationId xmlns:a16="http://schemas.microsoft.com/office/drawing/2014/main" id="{992513A8-C179-462A-9EA0-BE6E99C484E1}"/>
+                <a16:creationId xmlns:a16="http://schemas.microsoft.com/office/drawing/2014/main" xmlns="" id="{992513A8-C179-462A-9EA0-BE6E99C484E1}"/>
               </a:ext>
             </a:extLst>
           </p:cNvPr>
@@ -12051,7 +12051,7 @@
           <p:cNvPr id="8" name="Afbeelding 73">
             <a:extLst>
               <a:ext uri="{FF2B5EF4-FFF2-40B4-BE49-F238E27FC236}">
-                <a16:creationId xmlns:a16="http://schemas.microsoft.com/office/drawing/2014/main" id="{F5F674EA-1AAB-4E23-8519-AE3082288628}"/>
+                <a16:creationId xmlns:a16="http://schemas.microsoft.com/office/drawing/2014/main" xmlns="" id="{F5F674EA-1AAB-4E23-8519-AE3082288628}"/>
               </a:ext>
             </a:extLst>
           </p:cNvPr>
@@ -12085,7 +12085,7 @@
           <p:cNvPr id="9" name="Ovaal 74">
             <a:extLst>
               <a:ext uri="{FF2B5EF4-FFF2-40B4-BE49-F238E27FC236}">
-                <a16:creationId xmlns:a16="http://schemas.microsoft.com/office/drawing/2014/main" id="{85502D57-336B-4EBF-BFA6-3E6758C5A628}"/>
+                <a16:creationId xmlns:a16="http://schemas.microsoft.com/office/drawing/2014/main" xmlns="" id="{85502D57-336B-4EBF-BFA6-3E6758C5A628}"/>
               </a:ext>
             </a:extLst>
           </p:cNvPr>
@@ -12259,7 +12259,7 @@
           <p:cNvPr id="10" name="Afbeelding 75">
             <a:extLst>
               <a:ext uri="{FF2B5EF4-FFF2-40B4-BE49-F238E27FC236}">
-                <a16:creationId xmlns:a16="http://schemas.microsoft.com/office/drawing/2014/main" id="{A4840F8B-986F-4ABC-AE33-84F7790AC0FF}"/>
+                <a16:creationId xmlns:a16="http://schemas.microsoft.com/office/drawing/2014/main" xmlns="" id="{A4840F8B-986F-4ABC-AE33-84F7790AC0FF}"/>
               </a:ext>
             </a:extLst>
           </p:cNvPr>
@@ -12293,7 +12293,7 @@
           <p:cNvPr id="11" name="Ovaal 76">
             <a:extLst>
               <a:ext uri="{FF2B5EF4-FFF2-40B4-BE49-F238E27FC236}">
-                <a16:creationId xmlns:a16="http://schemas.microsoft.com/office/drawing/2014/main" id="{EC8E74C4-F529-4435-82CF-A0B61D85A7CD}"/>
+                <a16:creationId xmlns:a16="http://schemas.microsoft.com/office/drawing/2014/main" xmlns="" id="{EC8E74C4-F529-4435-82CF-A0B61D85A7CD}"/>
               </a:ext>
             </a:extLst>
           </p:cNvPr>
@@ -12467,7 +12467,7 @@
           <p:cNvPr id="12" name="Afbeelding 77">
             <a:extLst>
               <a:ext uri="{FF2B5EF4-FFF2-40B4-BE49-F238E27FC236}">
-                <a16:creationId xmlns:a16="http://schemas.microsoft.com/office/drawing/2014/main" id="{79BD1FD9-47D1-427D-9D06-574A07CA5A70}"/>
+                <a16:creationId xmlns:a16="http://schemas.microsoft.com/office/drawing/2014/main" xmlns="" id="{79BD1FD9-47D1-427D-9D06-574A07CA5A70}"/>
               </a:ext>
             </a:extLst>
           </p:cNvPr>
@@ -12501,7 +12501,7 @@
           <p:cNvPr id="13" name="Afbeelding 78">
             <a:extLst>
               <a:ext uri="{FF2B5EF4-FFF2-40B4-BE49-F238E27FC236}">
-                <a16:creationId xmlns:a16="http://schemas.microsoft.com/office/drawing/2014/main" id="{DC369DF1-8BD3-4C2B-8330-091255B8EEBC}"/>
+                <a16:creationId xmlns:a16="http://schemas.microsoft.com/office/drawing/2014/main" xmlns="" id="{DC369DF1-8BD3-4C2B-8330-091255B8EEBC}"/>
               </a:ext>
             </a:extLst>
           </p:cNvPr>
@@ -12535,7 +12535,7 @@
           <p:cNvPr id="14" name="Pijl: gebogen 26">
             <a:extLst>
               <a:ext uri="{FF2B5EF4-FFF2-40B4-BE49-F238E27FC236}">
-                <a16:creationId xmlns:a16="http://schemas.microsoft.com/office/drawing/2014/main" id="{E9BB21E2-4B11-47C6-A04E-B7F7DF9E81E2}"/>
+                <a16:creationId xmlns:a16="http://schemas.microsoft.com/office/drawing/2014/main" xmlns="" id="{E9BB21E2-4B11-47C6-A04E-B7F7DF9E81E2}"/>
               </a:ext>
             </a:extLst>
           </p:cNvPr>
@@ -12737,7 +12737,7 @@
           <p:cNvPr id="15" name="Tekstvak 80">
             <a:extLst>
               <a:ext uri="{FF2B5EF4-FFF2-40B4-BE49-F238E27FC236}">
-                <a16:creationId xmlns:a16="http://schemas.microsoft.com/office/drawing/2014/main" id="{4CCB3F50-254D-4E0D-8263-9E2822C3578E}"/>
+                <a16:creationId xmlns:a16="http://schemas.microsoft.com/office/drawing/2014/main" xmlns="" id="{4CCB3F50-254D-4E0D-8263-9E2822C3578E}"/>
               </a:ext>
             </a:extLst>
           </p:cNvPr>
@@ -12801,7 +12801,7 @@
           <p:cNvPr id="16" name="Pijl: links 31">
             <a:extLst>
               <a:ext uri="{FF2B5EF4-FFF2-40B4-BE49-F238E27FC236}">
-                <a16:creationId xmlns:a16="http://schemas.microsoft.com/office/drawing/2014/main" id="{C03CE675-487E-42B3-922F-3ED1150DC0DF}"/>
+                <a16:creationId xmlns:a16="http://schemas.microsoft.com/office/drawing/2014/main" xmlns="" id="{C03CE675-487E-42B3-922F-3ED1150DC0DF}"/>
               </a:ext>
             </a:extLst>
           </p:cNvPr>
@@ -12969,7 +12969,7 @@
           <p:cNvPr id="17" name="Rechthoek: afgeronde hoeken 32">
             <a:extLst>
               <a:ext uri="{FF2B5EF4-FFF2-40B4-BE49-F238E27FC236}">
-                <a16:creationId xmlns:a16="http://schemas.microsoft.com/office/drawing/2014/main" id="{DEFD864E-4B62-4AA3-A05B-3D0338AC149D}"/>
+                <a16:creationId xmlns:a16="http://schemas.microsoft.com/office/drawing/2014/main" xmlns="" id="{DEFD864E-4B62-4AA3-A05B-3D0338AC149D}"/>
               </a:ext>
             </a:extLst>
           </p:cNvPr>
@@ -13188,7 +13188,7 @@
           <p:cNvPr id="18" name="Afbeelding 83">
             <a:extLst>
               <a:ext uri="{FF2B5EF4-FFF2-40B4-BE49-F238E27FC236}">
-                <a16:creationId xmlns:a16="http://schemas.microsoft.com/office/drawing/2014/main" id="{098B1CC1-57BC-42A3-9550-3AAAD39EA66C}"/>
+                <a16:creationId xmlns:a16="http://schemas.microsoft.com/office/drawing/2014/main" xmlns="" id="{098B1CC1-57BC-42A3-9550-3AAAD39EA66C}"/>
               </a:ext>
             </a:extLst>
           </p:cNvPr>
@@ -13222,7 +13222,7 @@
           <p:cNvPr id="19" name="Afbeelding 84">
             <a:extLst>
               <a:ext uri="{FF2B5EF4-FFF2-40B4-BE49-F238E27FC236}">
-                <a16:creationId xmlns:a16="http://schemas.microsoft.com/office/drawing/2014/main" id="{9E75A2C1-1468-4598-A365-2A27844BF856}"/>
+                <a16:creationId xmlns:a16="http://schemas.microsoft.com/office/drawing/2014/main" xmlns="" id="{9E75A2C1-1468-4598-A365-2A27844BF856}"/>
               </a:ext>
             </a:extLst>
           </p:cNvPr>
@@ -13256,7 +13256,7 @@
           <p:cNvPr id="20" name="Rechte verbindingslijn 85">
             <a:extLst>
               <a:ext uri="{FF2B5EF4-FFF2-40B4-BE49-F238E27FC236}">
-                <a16:creationId xmlns:a16="http://schemas.microsoft.com/office/drawing/2014/main" id="{ED5DDB79-7887-4EE1-8439-2D44C8E82053}"/>
+                <a16:creationId xmlns:a16="http://schemas.microsoft.com/office/drawing/2014/main" xmlns="" id="{ED5DDB79-7887-4EE1-8439-2D44C8E82053}"/>
               </a:ext>
             </a:extLst>
           </p:cNvPr>
@@ -13286,7 +13286,7 @@
           <p:cNvPr id="21" name="Pijl: rechts 38">
             <a:extLst>
               <a:ext uri="{FF2B5EF4-FFF2-40B4-BE49-F238E27FC236}">
-                <a16:creationId xmlns:a16="http://schemas.microsoft.com/office/drawing/2014/main" id="{CF257037-FE1B-4FE5-B20A-8DF14F12986D}"/>
+                <a16:creationId xmlns:a16="http://schemas.microsoft.com/office/drawing/2014/main" xmlns="" id="{CF257037-FE1B-4FE5-B20A-8DF14F12986D}"/>
               </a:ext>
             </a:extLst>
           </p:cNvPr>
@@ -13455,7 +13455,7 @@
           <p:cNvPr id="22" name="Afbeelding 87">
             <a:extLst>
               <a:ext uri="{FF2B5EF4-FFF2-40B4-BE49-F238E27FC236}">
-                <a16:creationId xmlns:a16="http://schemas.microsoft.com/office/drawing/2014/main" id="{AAA32AAD-9960-4E8C-AD4F-2CBD8830D323}"/>
+                <a16:creationId xmlns:a16="http://schemas.microsoft.com/office/drawing/2014/main" xmlns="" id="{AAA32AAD-9960-4E8C-AD4F-2CBD8830D323}"/>
               </a:ext>
             </a:extLst>
           </p:cNvPr>
@@ -13514,7 +13514,7 @@
           <p:cNvPr id="2" name="Titel 1">
             <a:extLst>
               <a:ext uri="{FF2B5EF4-FFF2-40B4-BE49-F238E27FC236}">
-                <a16:creationId xmlns:a16="http://schemas.microsoft.com/office/drawing/2014/main" id="{5076D56F-B67B-475A-BE87-F4B58CA6745A}"/>
+                <a16:creationId xmlns:a16="http://schemas.microsoft.com/office/drawing/2014/main" xmlns="" id="{5076D56F-B67B-475A-BE87-F4B58CA6745A}"/>
               </a:ext>
             </a:extLst>
           </p:cNvPr>
@@ -13553,7 +13553,7 @@
               <p:cNvPr id="3" name="Tijdelijke aanduiding voor inhoud 2">
                 <a:extLst>
                   <a:ext uri="{FF2B5EF4-FFF2-40B4-BE49-F238E27FC236}">
-                    <a16:creationId xmlns:a16="http://schemas.microsoft.com/office/drawing/2014/main" id="{8541EF08-AEC2-463C-8D7F-E7899DFB5F2B}"/>
+                    <a16:creationId xmlns:a16="http://schemas.microsoft.com/office/drawing/2014/main" xmlns="" id="{8541EF08-AEC2-463C-8D7F-E7899DFB5F2B}"/>
                   </a:ext>
                 </a:extLst>
               </p:cNvPr>
@@ -13680,7 +13680,7 @@
           <p:cNvPr id="4" name="Afbeelding 10">
             <a:extLst>
               <a:ext uri="{FF2B5EF4-FFF2-40B4-BE49-F238E27FC236}">
-                <a16:creationId xmlns:a16="http://schemas.microsoft.com/office/drawing/2014/main" id="{2486C6B5-76F5-40F2-AB3E-74B7323C0347}"/>
+                <a16:creationId xmlns:a16="http://schemas.microsoft.com/office/drawing/2014/main" xmlns="" id="{2486C6B5-76F5-40F2-AB3E-74B7323C0347}"/>
               </a:ext>
             </a:extLst>
           </p:cNvPr>
@@ -13714,7 +13714,7 @@
           <p:cNvPr id="5" name="Afbeelding 11">
             <a:extLst>
               <a:ext uri="{FF2B5EF4-FFF2-40B4-BE49-F238E27FC236}">
-                <a16:creationId xmlns:a16="http://schemas.microsoft.com/office/drawing/2014/main" id="{DA44DDCB-D11E-4646-8C3C-2688AE0E961F}"/>
+                <a16:creationId xmlns:a16="http://schemas.microsoft.com/office/drawing/2014/main" xmlns="" id="{DA44DDCB-D11E-4646-8C3C-2688AE0E961F}"/>
               </a:ext>
             </a:extLst>
           </p:cNvPr>
@@ -13773,7 +13773,7 @@
           <p:cNvPr id="2" name="Titel 2">
             <a:extLst>
               <a:ext uri="{FF2B5EF4-FFF2-40B4-BE49-F238E27FC236}">
-                <a16:creationId xmlns:a16="http://schemas.microsoft.com/office/drawing/2014/main" id="{51675E7E-A1EA-4FB4-84C4-FBE042AD4EB7}"/>
+                <a16:creationId xmlns:a16="http://schemas.microsoft.com/office/drawing/2014/main" xmlns="" id="{51675E7E-A1EA-4FB4-84C4-FBE042AD4EB7}"/>
               </a:ext>
             </a:extLst>
           </p:cNvPr>
@@ -13802,7 +13802,7 @@
           <p:cNvPr id="3" name="Afbeelding 3">
             <a:extLst>
               <a:ext uri="{FF2B5EF4-FFF2-40B4-BE49-F238E27FC236}">
-                <a16:creationId xmlns:a16="http://schemas.microsoft.com/office/drawing/2014/main" id="{6623158C-8294-47A5-8057-FC2FF2210875}"/>
+                <a16:creationId xmlns:a16="http://schemas.microsoft.com/office/drawing/2014/main" xmlns="" id="{6623158C-8294-47A5-8057-FC2FF2210875}"/>
               </a:ext>
             </a:extLst>
           </p:cNvPr>
@@ -13836,7 +13836,7 @@
           <p:cNvPr id="4" name="Ovaal 14">
             <a:extLst>
               <a:ext uri="{FF2B5EF4-FFF2-40B4-BE49-F238E27FC236}">
-                <a16:creationId xmlns:a16="http://schemas.microsoft.com/office/drawing/2014/main" id="{BE11FE82-C1BF-48F0-9440-86C5AD145F70}"/>
+                <a16:creationId xmlns:a16="http://schemas.microsoft.com/office/drawing/2014/main" xmlns="" id="{BE11FE82-C1BF-48F0-9440-86C5AD145F70}"/>
               </a:ext>
             </a:extLst>
           </p:cNvPr>
@@ -14009,7 +14009,7 @@
           <p:cNvPr id="5" name="Ovaal 15">
             <a:extLst>
               <a:ext uri="{FF2B5EF4-FFF2-40B4-BE49-F238E27FC236}">
-                <a16:creationId xmlns:a16="http://schemas.microsoft.com/office/drawing/2014/main" id="{F998528A-397C-40A3-A464-22B64A2FE6A2}"/>
+                <a16:creationId xmlns:a16="http://schemas.microsoft.com/office/drawing/2014/main" xmlns="" id="{F998528A-397C-40A3-A464-22B64A2FE6A2}"/>
               </a:ext>
             </a:extLst>
           </p:cNvPr>
@@ -14182,7 +14182,7 @@
           <p:cNvPr id="6" name="Tijdelijke aanduiding voor inhoud 2">
             <a:extLst>
               <a:ext uri="{FF2B5EF4-FFF2-40B4-BE49-F238E27FC236}">
-                <a16:creationId xmlns:a16="http://schemas.microsoft.com/office/drawing/2014/main" id="{CBBF0E9A-2BE5-4744-8649-E564C987DD26}"/>
+                <a16:creationId xmlns:a16="http://schemas.microsoft.com/office/drawing/2014/main" xmlns="" id="{CBBF0E9A-2BE5-4744-8649-E564C987DD26}"/>
               </a:ext>
             </a:extLst>
           </p:cNvPr>
@@ -14223,7 +14223,7 @@
           <p:cNvPr id="7" name="Ovaal 14">
             <a:extLst>
               <a:ext uri="{FF2B5EF4-FFF2-40B4-BE49-F238E27FC236}">
-                <a16:creationId xmlns:a16="http://schemas.microsoft.com/office/drawing/2014/main" id="{D5D64F44-B794-4A9A-830D-BB92C035F153}"/>
+                <a16:creationId xmlns:a16="http://schemas.microsoft.com/office/drawing/2014/main" xmlns="" id="{D5D64F44-B794-4A9A-830D-BB92C035F153}"/>
               </a:ext>
             </a:extLst>
           </p:cNvPr>
@@ -14396,7 +14396,7 @@
           <p:cNvPr id="8" name="Ovaal 15">
             <a:extLst>
               <a:ext uri="{FF2B5EF4-FFF2-40B4-BE49-F238E27FC236}">
-                <a16:creationId xmlns:a16="http://schemas.microsoft.com/office/drawing/2014/main" id="{C8F1A24E-3E78-493D-B87C-3ED1A202B754}"/>
+                <a16:creationId xmlns:a16="http://schemas.microsoft.com/office/drawing/2014/main" xmlns="" id="{C8F1A24E-3E78-493D-B87C-3ED1A202B754}"/>
               </a:ext>
             </a:extLst>
           </p:cNvPr>
@@ -14594,7 +14594,7 @@
           <p:cNvPr id="2" name="Titel 2">
             <a:extLst>
               <a:ext uri="{FF2B5EF4-FFF2-40B4-BE49-F238E27FC236}">
-                <a16:creationId xmlns:a16="http://schemas.microsoft.com/office/drawing/2014/main" id="{7A2A807E-D637-4BA0-9583-FE5A39A87798}"/>
+                <a16:creationId xmlns:a16="http://schemas.microsoft.com/office/drawing/2014/main" xmlns="" id="{7A2A807E-D637-4BA0-9583-FE5A39A87798}"/>
               </a:ext>
             </a:extLst>
           </p:cNvPr>
@@ -14623,7 +14623,7 @@
           <p:cNvPr id="3" name="Afbeelding 3">
             <a:extLst>
               <a:ext uri="{FF2B5EF4-FFF2-40B4-BE49-F238E27FC236}">
-                <a16:creationId xmlns:a16="http://schemas.microsoft.com/office/drawing/2014/main" id="{2F59609E-13A5-41A3-91FD-883A1A970DAF}"/>
+                <a16:creationId xmlns:a16="http://schemas.microsoft.com/office/drawing/2014/main" xmlns="" id="{2F59609E-13A5-41A3-91FD-883A1A970DAF}"/>
               </a:ext>
             </a:extLst>
           </p:cNvPr>
@@ -14682,7 +14682,7 @@
           <p:cNvPr id="2" name="Titel 4">
             <a:extLst>
               <a:ext uri="{FF2B5EF4-FFF2-40B4-BE49-F238E27FC236}">
-                <a16:creationId xmlns:a16="http://schemas.microsoft.com/office/drawing/2014/main" id="{B7F5E391-A2D9-4A1D-B4A3-C7F5185AB138}"/>
+                <a16:creationId xmlns:a16="http://schemas.microsoft.com/office/drawing/2014/main" xmlns="" id="{B7F5E391-A2D9-4A1D-B4A3-C7F5185AB138}"/>
               </a:ext>
             </a:extLst>
           </p:cNvPr>
@@ -14715,7 +14715,7 @@
           <p:cNvPr id="3" name="Tijdelijke aanduiding voor inhoud 2">
             <a:extLst>
               <a:ext uri="{FF2B5EF4-FFF2-40B4-BE49-F238E27FC236}">
-                <a16:creationId xmlns:a16="http://schemas.microsoft.com/office/drawing/2014/main" id="{AF0A932F-7765-4540-A15D-BC0318FF0279}"/>
+                <a16:creationId xmlns:a16="http://schemas.microsoft.com/office/drawing/2014/main" xmlns="" id="{AF0A932F-7765-4540-A15D-BC0318FF0279}"/>
               </a:ext>
             </a:extLst>
           </p:cNvPr>
@@ -14756,7 +14756,7 @@
           <p:cNvPr id="4" name="Afbeelding 6">
             <a:extLst>
               <a:ext uri="{FF2B5EF4-FFF2-40B4-BE49-F238E27FC236}">
-                <a16:creationId xmlns:a16="http://schemas.microsoft.com/office/drawing/2014/main" id="{F6BCD372-4A6D-47F2-B16A-B2D65D988FF7}"/>
+                <a16:creationId xmlns:a16="http://schemas.microsoft.com/office/drawing/2014/main" xmlns="" id="{F6BCD372-4A6D-47F2-B16A-B2D65D988FF7}"/>
               </a:ext>
             </a:extLst>
           </p:cNvPr>
@@ -14790,7 +14790,7 @@
           <p:cNvPr id="5" name="Afbeelding 7">
             <a:extLst>
               <a:ext uri="{FF2B5EF4-FFF2-40B4-BE49-F238E27FC236}">
-                <a16:creationId xmlns:a16="http://schemas.microsoft.com/office/drawing/2014/main" id="{29362972-238A-48AE-9588-7C55A914E68D}"/>
+                <a16:creationId xmlns:a16="http://schemas.microsoft.com/office/drawing/2014/main" xmlns="" id="{29362972-238A-48AE-9588-7C55A914E68D}"/>
               </a:ext>
             </a:extLst>
           </p:cNvPr>
@@ -14824,7 +14824,7 @@
           <p:cNvPr id="6" name="Ovaal 8">
             <a:extLst>
               <a:ext uri="{FF2B5EF4-FFF2-40B4-BE49-F238E27FC236}">
-                <a16:creationId xmlns:a16="http://schemas.microsoft.com/office/drawing/2014/main" id="{8AB576F1-ECBF-45BE-9070-2D12CC4C646A}"/>
+                <a16:creationId xmlns:a16="http://schemas.microsoft.com/office/drawing/2014/main" xmlns="" id="{8AB576F1-ECBF-45BE-9070-2D12CC4C646A}"/>
               </a:ext>
             </a:extLst>
           </p:cNvPr>
@@ -14997,7 +14997,7 @@
           <p:cNvPr id="7" name="Ovaal 9">
             <a:extLst>
               <a:ext uri="{FF2B5EF4-FFF2-40B4-BE49-F238E27FC236}">
-                <a16:creationId xmlns:a16="http://schemas.microsoft.com/office/drawing/2014/main" id="{1F99B134-9693-4951-9F76-462D7C029DC5}"/>
+                <a16:creationId xmlns:a16="http://schemas.microsoft.com/office/drawing/2014/main" xmlns="" id="{1F99B134-9693-4951-9F76-462D7C029DC5}"/>
               </a:ext>
             </a:extLst>
           </p:cNvPr>
@@ -15170,7 +15170,7 @@
           <p:cNvPr id="8" name="Ovaal 10">
             <a:extLst>
               <a:ext uri="{FF2B5EF4-FFF2-40B4-BE49-F238E27FC236}">
-                <a16:creationId xmlns:a16="http://schemas.microsoft.com/office/drawing/2014/main" id="{CE93836E-CC6A-4F3E-BAB7-D0B9E09F122D}"/>
+                <a16:creationId xmlns:a16="http://schemas.microsoft.com/office/drawing/2014/main" xmlns="" id="{CE93836E-CC6A-4F3E-BAB7-D0B9E09F122D}"/>
               </a:ext>
             </a:extLst>
           </p:cNvPr>
@@ -15343,7 +15343,7 @@
           <p:cNvPr id="9" name="Ovaal 11">
             <a:extLst>
               <a:ext uri="{FF2B5EF4-FFF2-40B4-BE49-F238E27FC236}">
-                <a16:creationId xmlns:a16="http://schemas.microsoft.com/office/drawing/2014/main" id="{1876E809-81D1-4C89-AAA5-DEA77CC50AA7}"/>
+                <a16:creationId xmlns:a16="http://schemas.microsoft.com/office/drawing/2014/main" xmlns="" id="{1876E809-81D1-4C89-AAA5-DEA77CC50AA7}"/>
               </a:ext>
             </a:extLst>
           </p:cNvPr>
@@ -15516,7 +15516,7 @@
           <p:cNvPr id="10" name="Ovaal 12">
             <a:extLst>
               <a:ext uri="{FF2B5EF4-FFF2-40B4-BE49-F238E27FC236}">
-                <a16:creationId xmlns:a16="http://schemas.microsoft.com/office/drawing/2014/main" id="{742CD2BD-97AA-4B57-BFB3-0E448CAA7315}"/>
+                <a16:creationId xmlns:a16="http://schemas.microsoft.com/office/drawing/2014/main" xmlns="" id="{742CD2BD-97AA-4B57-BFB3-0E448CAA7315}"/>
               </a:ext>
             </a:extLst>
           </p:cNvPr>
@@ -15689,7 +15689,7 @@
           <p:cNvPr id="11" name="Ovaal 13">
             <a:extLst>
               <a:ext uri="{FF2B5EF4-FFF2-40B4-BE49-F238E27FC236}">
-                <a16:creationId xmlns:a16="http://schemas.microsoft.com/office/drawing/2014/main" id="{B7A5660E-436F-4827-AA96-B93252214A4A}"/>
+                <a16:creationId xmlns:a16="http://schemas.microsoft.com/office/drawing/2014/main" xmlns="" id="{B7A5660E-436F-4827-AA96-B93252214A4A}"/>
               </a:ext>
             </a:extLst>
           </p:cNvPr>
@@ -15862,7 +15862,7 @@
           <p:cNvPr id="12" name="Ovaal 14">
             <a:extLst>
               <a:ext uri="{FF2B5EF4-FFF2-40B4-BE49-F238E27FC236}">
-                <a16:creationId xmlns:a16="http://schemas.microsoft.com/office/drawing/2014/main" id="{5CBA3882-E150-4A50-89A8-0538FB29434C}"/>
+                <a16:creationId xmlns:a16="http://schemas.microsoft.com/office/drawing/2014/main" xmlns="" id="{5CBA3882-E150-4A50-89A8-0538FB29434C}"/>
               </a:ext>
             </a:extLst>
           </p:cNvPr>
@@ -16035,7 +16035,7 @@
           <p:cNvPr id="13" name="Ovaal 15">
             <a:extLst>
               <a:ext uri="{FF2B5EF4-FFF2-40B4-BE49-F238E27FC236}">
-                <a16:creationId xmlns:a16="http://schemas.microsoft.com/office/drawing/2014/main" id="{A6BE9597-00D6-4A23-BAF8-2D34AA7408EE}"/>
+                <a16:creationId xmlns:a16="http://schemas.microsoft.com/office/drawing/2014/main" xmlns="" id="{A6BE9597-00D6-4A23-BAF8-2D34AA7408EE}"/>
               </a:ext>
             </a:extLst>
           </p:cNvPr>
@@ -16500,7 +16500,7 @@
   <a:extraClrSchemeLst/>
   <a:extLst>
     <a:ext uri="{05A4C25C-085E-4340-85A3-A5531E510DB2}">
-      <thm15:themeFamily xmlns:thm15="http://schemas.microsoft.com/office/thememl/2012/main" name="Office Theme" id="{62F939B6-93AF-4DB8-9C6B-D6C7DFDC589F}" vid="{4A3C46E8-61CC-4603-A589-7422A47A8E4A}"/>
+      <thm15:themeFamily xmlns:thm15="http://schemas.microsoft.com/office/thememl/2012/main" xmlns="" name="Office Theme" id="{62F939B6-93AF-4DB8-9C6B-D6C7DFDC589F}" vid="{4A3C46E8-61CC-4603-A589-7422A47A8E4A}"/>
     </a:ext>
   </a:extLst>
 </a:theme>

</xml_diff>